<commit_message>
Update my info, changed last module on OO slide to "Module 6"
</commit_message>
<xml_diff>
--- a/presentation/FSharpForData.pptx
+++ b/presentation/FSharpForData.pptx
@@ -145,6 +145,10 @@
 </p:presentation>
 </file>
 
+<file path=ppt/revisionInfo.xml><?xml version="1.0" encoding="utf-8"?>
+<p1510:revInfo xmlns:a="http://schemas.openxmlformats.org/drawingml/2006/main" xmlns:r="http://schemas.openxmlformats.org/officeDocument/2006/relationships" xmlns:p1510="http://schemas.microsoft.com/office/powerpoint/2015/10/main"/>
+</file>
+
 <file path=ppt/notesMasters/notesMaster1.xml><?xml version="1.0" encoding="utf-8"?>
 <p:notesMaster xmlns:a="http://schemas.openxmlformats.org/drawingml/2006/main" xmlns:r="http://schemas.openxmlformats.org/officeDocument/2006/relationships" xmlns:p="http://schemas.openxmlformats.org/presentationml/2006/main">
   <p:cSld>
@@ -227,7 +231,7 @@
           <a:p>
             <a:fld id="{63EA6277-32A6-4B29-B323-2A7ABE731332}" type="datetimeFigureOut">
               <a:rPr lang="en-US" smtClean="0"/>
-              <a:t>11/15/2017</a:t>
+              <a:t>11/21/2017</a:t>
             </a:fld>
             <a:endParaRPr lang="en-US"/>
           </a:p>
@@ -291,38 +295,37 @@
           <a:p>
             <a:pPr lvl="0"/>
             <a:r>
-              <a:rPr lang="en-US" smtClean="0"/>
+              <a:rPr lang="en-US"/>
               <a:t>Click to edit Master text styles</a:t>
             </a:r>
           </a:p>
           <a:p>
             <a:pPr lvl="1"/>
             <a:r>
-              <a:rPr lang="en-US" smtClean="0"/>
+              <a:rPr lang="en-US"/>
               <a:t>Second level</a:t>
             </a:r>
           </a:p>
           <a:p>
             <a:pPr lvl="2"/>
             <a:r>
-              <a:rPr lang="en-US" smtClean="0"/>
+              <a:rPr lang="en-US"/>
               <a:t>Third level</a:t>
             </a:r>
           </a:p>
           <a:p>
             <a:pPr lvl="3"/>
             <a:r>
-              <a:rPr lang="en-US" smtClean="0"/>
+              <a:rPr lang="en-US"/>
               <a:t>Fourth level</a:t>
             </a:r>
           </a:p>
           <a:p>
             <a:pPr lvl="4"/>
             <a:r>
-              <a:rPr lang="en-US" smtClean="0"/>
+              <a:rPr lang="en-US"/>
               <a:t>Fifth level</a:t>
             </a:r>
-            <a:endParaRPr lang="en-US"/>
           </a:p>
         </p:txBody>
       </p:sp>
@@ -540,21 +543,21 @@
           <a:lstStyle/>
           <a:p>
             <a:r>
-              <a:rPr lang="en-US" dirty="0" err="1" smtClean="0"/>
+              <a:rPr lang="en-US" dirty="0" err="1"/>
               <a:t>Csv.open</a:t>
             </a:r>
-            <a:endParaRPr lang="en-US" dirty="0" smtClean="0"/>
-          </a:p>
-          <a:p>
-            <a:r>
-              <a:rPr lang="en-US" dirty="0" err="1" smtClean="0"/>
+            <a:endParaRPr lang="en-US" dirty="0"/>
+          </a:p>
+          <a:p>
+            <a:r>
+              <a:rPr lang="en-US" dirty="0" err="1"/>
               <a:t>Json.loads</a:t>
             </a:r>
-            <a:endParaRPr lang="en-US" dirty="0" smtClean="0"/>
-          </a:p>
-          <a:p>
-            <a:r>
-              <a:rPr lang="en-US" dirty="0" err="1" smtClean="0"/>
+            <a:endParaRPr lang="en-US" dirty="0"/>
+          </a:p>
+          <a:p>
+            <a:r>
+              <a:rPr lang="en-US" dirty="0" err="1"/>
               <a:t>Sql.Execute</a:t>
             </a:r>
             <a:endParaRPr lang="en-US" dirty="0"/>
@@ -978,10 +981,9 @@
           <a:lstStyle/>
           <a:p>
             <a:r>
-              <a:rPr lang="en-US" dirty="0" smtClean="0"/>
+              <a:rPr lang="en-US" dirty="0"/>
               <a:t>	</a:t>
             </a:r>
-            <a:endParaRPr lang="en-US" dirty="0"/>
           </a:p>
         </p:txBody>
       </p:sp>
@@ -1059,10 +1061,9 @@
           <a:lstStyle/>
           <a:p>
             <a:r>
-              <a:rPr lang="en-US" smtClean="0"/>
+              <a:rPr lang="en-US"/>
               <a:t>Click to edit Master title style</a:t>
             </a:r>
-            <a:endParaRPr lang="en-US"/>
           </a:p>
         </p:txBody>
       </p:sp>
@@ -1178,10 +1179,9 @@
           </a:lstStyle>
           <a:p>
             <a:r>
-              <a:rPr lang="en-US" smtClean="0"/>
+              <a:rPr lang="en-US"/>
               <a:t>Click to edit Master subtitle style</a:t>
             </a:r>
-            <a:endParaRPr lang="en-US"/>
           </a:p>
         </p:txBody>
       </p:sp>
@@ -1202,7 +1202,7 @@
           <a:p>
             <a:fld id="{2019D7E9-D108-4FE4-8462-55C3BE1817A8}" type="datetimeFigureOut">
               <a:rPr lang="en-US" smtClean="0"/>
-              <a:t>11/15/2017</a:t>
+              <a:t>11/21/2017</a:t>
             </a:fld>
             <a:endParaRPr lang="en-US"/>
           </a:p>
@@ -1296,10 +1296,9 @@
           <a:lstStyle/>
           <a:p>
             <a:r>
-              <a:rPr lang="en-US" smtClean="0"/>
+              <a:rPr lang="en-US"/>
               <a:t>Click to edit Master title style</a:t>
             </a:r>
-            <a:endParaRPr lang="en-US"/>
           </a:p>
         </p:txBody>
       </p:sp>
@@ -1320,38 +1319,37 @@
           <a:p>
             <a:pPr lvl="0"/>
             <a:r>
-              <a:rPr lang="en-US" smtClean="0"/>
+              <a:rPr lang="en-US"/>
               <a:t>Click to edit Master text styles</a:t>
             </a:r>
           </a:p>
           <a:p>
             <a:pPr lvl="1"/>
             <a:r>
-              <a:rPr lang="en-US" smtClean="0"/>
+              <a:rPr lang="en-US"/>
               <a:t>Second level</a:t>
             </a:r>
           </a:p>
           <a:p>
             <a:pPr lvl="2"/>
             <a:r>
-              <a:rPr lang="en-US" smtClean="0"/>
+              <a:rPr lang="en-US"/>
               <a:t>Third level</a:t>
             </a:r>
           </a:p>
           <a:p>
             <a:pPr lvl="3"/>
             <a:r>
-              <a:rPr lang="en-US" smtClean="0"/>
+              <a:rPr lang="en-US"/>
               <a:t>Fourth level</a:t>
             </a:r>
           </a:p>
           <a:p>
             <a:pPr lvl="4"/>
             <a:r>
-              <a:rPr lang="en-US" smtClean="0"/>
+              <a:rPr lang="en-US"/>
               <a:t>Fifth level</a:t>
             </a:r>
-            <a:endParaRPr lang="en-US"/>
           </a:p>
         </p:txBody>
       </p:sp>
@@ -1372,7 +1370,7 @@
           <a:p>
             <a:fld id="{2019D7E9-D108-4FE4-8462-55C3BE1817A8}" type="datetimeFigureOut">
               <a:rPr lang="en-US" smtClean="0"/>
-              <a:t>11/15/2017</a:t>
+              <a:t>11/21/2017</a:t>
             </a:fld>
             <a:endParaRPr lang="en-US"/>
           </a:p>
@@ -1471,10 +1469,9 @@
           <a:lstStyle/>
           <a:p>
             <a:r>
-              <a:rPr lang="en-US" smtClean="0"/>
+              <a:rPr lang="en-US"/>
               <a:t>Click to edit Master title style</a:t>
             </a:r>
-            <a:endParaRPr lang="en-US"/>
           </a:p>
         </p:txBody>
       </p:sp>
@@ -1500,38 +1497,37 @@
           <a:p>
             <a:pPr lvl="0"/>
             <a:r>
-              <a:rPr lang="en-US" smtClean="0"/>
+              <a:rPr lang="en-US"/>
               <a:t>Click to edit Master text styles</a:t>
             </a:r>
           </a:p>
           <a:p>
             <a:pPr lvl="1"/>
             <a:r>
-              <a:rPr lang="en-US" smtClean="0"/>
+              <a:rPr lang="en-US"/>
               <a:t>Second level</a:t>
             </a:r>
           </a:p>
           <a:p>
             <a:pPr lvl="2"/>
             <a:r>
-              <a:rPr lang="en-US" smtClean="0"/>
+              <a:rPr lang="en-US"/>
               <a:t>Third level</a:t>
             </a:r>
           </a:p>
           <a:p>
             <a:pPr lvl="3"/>
             <a:r>
-              <a:rPr lang="en-US" smtClean="0"/>
+              <a:rPr lang="en-US"/>
               <a:t>Fourth level</a:t>
             </a:r>
           </a:p>
           <a:p>
             <a:pPr lvl="4"/>
             <a:r>
-              <a:rPr lang="en-US" smtClean="0"/>
+              <a:rPr lang="en-US"/>
               <a:t>Fifth level</a:t>
             </a:r>
-            <a:endParaRPr lang="en-US"/>
           </a:p>
         </p:txBody>
       </p:sp>
@@ -1552,7 +1548,7 @@
           <a:p>
             <a:fld id="{2019D7E9-D108-4FE4-8462-55C3BE1817A8}" type="datetimeFigureOut">
               <a:rPr lang="en-US" smtClean="0"/>
-              <a:t>11/15/2017</a:t>
+              <a:t>11/21/2017</a:t>
             </a:fld>
             <a:endParaRPr lang="en-US"/>
           </a:p>
@@ -1646,10 +1642,9 @@
           <a:lstStyle/>
           <a:p>
             <a:r>
-              <a:rPr lang="en-US" smtClean="0"/>
+              <a:rPr lang="en-US"/>
               <a:t>Click to edit Master title style</a:t>
             </a:r>
-            <a:endParaRPr lang="en-US"/>
           </a:p>
         </p:txBody>
       </p:sp>
@@ -1670,38 +1665,37 @@
           <a:p>
             <a:pPr lvl="0"/>
             <a:r>
-              <a:rPr lang="en-US" smtClean="0"/>
+              <a:rPr lang="en-US"/>
               <a:t>Click to edit Master text styles</a:t>
             </a:r>
           </a:p>
           <a:p>
             <a:pPr lvl="1"/>
             <a:r>
-              <a:rPr lang="en-US" smtClean="0"/>
+              <a:rPr lang="en-US"/>
               <a:t>Second level</a:t>
             </a:r>
           </a:p>
           <a:p>
             <a:pPr lvl="2"/>
             <a:r>
-              <a:rPr lang="en-US" smtClean="0"/>
+              <a:rPr lang="en-US"/>
               <a:t>Third level</a:t>
             </a:r>
           </a:p>
           <a:p>
             <a:pPr lvl="3"/>
             <a:r>
-              <a:rPr lang="en-US" smtClean="0"/>
+              <a:rPr lang="en-US"/>
               <a:t>Fourth level</a:t>
             </a:r>
           </a:p>
           <a:p>
             <a:pPr lvl="4"/>
             <a:r>
-              <a:rPr lang="en-US" smtClean="0"/>
+              <a:rPr lang="en-US"/>
               <a:t>Fifth level</a:t>
             </a:r>
-            <a:endParaRPr lang="en-US"/>
           </a:p>
         </p:txBody>
       </p:sp>
@@ -1722,7 +1716,7 @@
           <a:p>
             <a:fld id="{2019D7E9-D108-4FE4-8462-55C3BE1817A8}" type="datetimeFigureOut">
               <a:rPr lang="en-US" smtClean="0"/>
-              <a:t>11/15/2017</a:t>
+              <a:t>11/21/2017</a:t>
             </a:fld>
             <a:endParaRPr lang="en-US"/>
           </a:p>
@@ -1825,10 +1819,9 @@
           </a:lstStyle>
           <a:p>
             <a:r>
-              <a:rPr lang="en-US" smtClean="0"/>
+              <a:rPr lang="en-US"/>
               <a:t>Click to edit Master title style</a:t>
             </a:r>
-            <a:endParaRPr lang="en-US"/>
           </a:p>
         </p:txBody>
       </p:sp>
@@ -1945,7 +1938,7 @@
           <a:p>
             <a:pPr lvl="0"/>
             <a:r>
-              <a:rPr lang="en-US" smtClean="0"/>
+              <a:rPr lang="en-US"/>
               <a:t>Click to edit Master text styles</a:t>
             </a:r>
           </a:p>
@@ -1968,7 +1961,7 @@
           <a:p>
             <a:fld id="{2019D7E9-D108-4FE4-8462-55C3BE1817A8}" type="datetimeFigureOut">
               <a:rPr lang="en-US" smtClean="0"/>
-              <a:t>11/15/2017</a:t>
+              <a:t>11/21/2017</a:t>
             </a:fld>
             <a:endParaRPr lang="en-US"/>
           </a:p>
@@ -2062,10 +2055,9 @@
           <a:lstStyle/>
           <a:p>
             <a:r>
-              <a:rPr lang="en-US" smtClean="0"/>
+              <a:rPr lang="en-US"/>
               <a:t>Click to edit Master title style</a:t>
             </a:r>
-            <a:endParaRPr lang="en-US"/>
           </a:p>
         </p:txBody>
       </p:sp>
@@ -2119,38 +2111,37 @@
           <a:p>
             <a:pPr lvl="0"/>
             <a:r>
-              <a:rPr lang="en-US" smtClean="0"/>
+              <a:rPr lang="en-US"/>
               <a:t>Click to edit Master text styles</a:t>
             </a:r>
           </a:p>
           <a:p>
             <a:pPr lvl="1"/>
             <a:r>
-              <a:rPr lang="en-US" smtClean="0"/>
+              <a:rPr lang="en-US"/>
               <a:t>Second level</a:t>
             </a:r>
           </a:p>
           <a:p>
             <a:pPr lvl="2"/>
             <a:r>
-              <a:rPr lang="en-US" smtClean="0"/>
+              <a:rPr lang="en-US"/>
               <a:t>Third level</a:t>
             </a:r>
           </a:p>
           <a:p>
             <a:pPr lvl="3"/>
             <a:r>
-              <a:rPr lang="en-US" smtClean="0"/>
+              <a:rPr lang="en-US"/>
               <a:t>Fourth level</a:t>
             </a:r>
           </a:p>
           <a:p>
             <a:pPr lvl="4"/>
             <a:r>
-              <a:rPr lang="en-US" smtClean="0"/>
+              <a:rPr lang="en-US"/>
               <a:t>Fifth level</a:t>
             </a:r>
-            <a:endParaRPr lang="en-US"/>
           </a:p>
         </p:txBody>
       </p:sp>
@@ -2204,38 +2195,37 @@
           <a:p>
             <a:pPr lvl="0"/>
             <a:r>
-              <a:rPr lang="en-US" smtClean="0"/>
+              <a:rPr lang="en-US"/>
               <a:t>Click to edit Master text styles</a:t>
             </a:r>
           </a:p>
           <a:p>
             <a:pPr lvl="1"/>
             <a:r>
-              <a:rPr lang="en-US" smtClean="0"/>
+              <a:rPr lang="en-US"/>
               <a:t>Second level</a:t>
             </a:r>
           </a:p>
           <a:p>
             <a:pPr lvl="2"/>
             <a:r>
-              <a:rPr lang="en-US" smtClean="0"/>
+              <a:rPr lang="en-US"/>
               <a:t>Third level</a:t>
             </a:r>
           </a:p>
           <a:p>
             <a:pPr lvl="3"/>
             <a:r>
-              <a:rPr lang="en-US" smtClean="0"/>
+              <a:rPr lang="en-US"/>
               <a:t>Fourth level</a:t>
             </a:r>
           </a:p>
           <a:p>
             <a:pPr lvl="4"/>
             <a:r>
-              <a:rPr lang="en-US" smtClean="0"/>
+              <a:rPr lang="en-US"/>
               <a:t>Fifth level</a:t>
             </a:r>
-            <a:endParaRPr lang="en-US"/>
           </a:p>
         </p:txBody>
       </p:sp>
@@ -2256,7 +2246,7 @@
           <a:p>
             <a:fld id="{2019D7E9-D108-4FE4-8462-55C3BE1817A8}" type="datetimeFigureOut">
               <a:rPr lang="en-US" smtClean="0"/>
-              <a:t>11/15/2017</a:t>
+              <a:t>11/21/2017</a:t>
             </a:fld>
             <a:endParaRPr lang="en-US"/>
           </a:p>
@@ -2354,10 +2344,9 @@
           </a:lstStyle>
           <a:p>
             <a:r>
-              <a:rPr lang="en-US" smtClean="0"/>
+              <a:rPr lang="en-US"/>
               <a:t>Click to edit Master title style</a:t>
             </a:r>
-            <a:endParaRPr lang="en-US"/>
           </a:p>
         </p:txBody>
       </p:sp>
@@ -2420,7 +2409,7 @@
           <a:p>
             <a:pPr lvl="0"/>
             <a:r>
-              <a:rPr lang="en-US" smtClean="0"/>
+              <a:rPr lang="en-US"/>
               <a:t>Click to edit Master text styles</a:t>
             </a:r>
           </a:p>
@@ -2476,38 +2465,37 @@
           <a:p>
             <a:pPr lvl="0"/>
             <a:r>
-              <a:rPr lang="en-US" smtClean="0"/>
+              <a:rPr lang="en-US"/>
               <a:t>Click to edit Master text styles</a:t>
             </a:r>
           </a:p>
           <a:p>
             <a:pPr lvl="1"/>
             <a:r>
-              <a:rPr lang="en-US" smtClean="0"/>
+              <a:rPr lang="en-US"/>
               <a:t>Second level</a:t>
             </a:r>
           </a:p>
           <a:p>
             <a:pPr lvl="2"/>
             <a:r>
-              <a:rPr lang="en-US" smtClean="0"/>
+              <a:rPr lang="en-US"/>
               <a:t>Third level</a:t>
             </a:r>
           </a:p>
           <a:p>
             <a:pPr lvl="3"/>
             <a:r>
-              <a:rPr lang="en-US" smtClean="0"/>
+              <a:rPr lang="en-US"/>
               <a:t>Fourth level</a:t>
             </a:r>
           </a:p>
           <a:p>
             <a:pPr lvl="4"/>
             <a:r>
-              <a:rPr lang="en-US" smtClean="0"/>
+              <a:rPr lang="en-US"/>
               <a:t>Fifth level</a:t>
             </a:r>
-            <a:endParaRPr lang="en-US"/>
           </a:p>
         </p:txBody>
       </p:sp>
@@ -2570,7 +2558,7 @@
           <a:p>
             <a:pPr lvl="0"/>
             <a:r>
-              <a:rPr lang="en-US" smtClean="0"/>
+              <a:rPr lang="en-US"/>
               <a:t>Click to edit Master text styles</a:t>
             </a:r>
           </a:p>
@@ -2626,38 +2614,37 @@
           <a:p>
             <a:pPr lvl="0"/>
             <a:r>
-              <a:rPr lang="en-US" smtClean="0"/>
+              <a:rPr lang="en-US"/>
               <a:t>Click to edit Master text styles</a:t>
             </a:r>
           </a:p>
           <a:p>
             <a:pPr lvl="1"/>
             <a:r>
-              <a:rPr lang="en-US" smtClean="0"/>
+              <a:rPr lang="en-US"/>
               <a:t>Second level</a:t>
             </a:r>
           </a:p>
           <a:p>
             <a:pPr lvl="2"/>
             <a:r>
-              <a:rPr lang="en-US" smtClean="0"/>
+              <a:rPr lang="en-US"/>
               <a:t>Third level</a:t>
             </a:r>
           </a:p>
           <a:p>
             <a:pPr lvl="3"/>
             <a:r>
-              <a:rPr lang="en-US" smtClean="0"/>
+              <a:rPr lang="en-US"/>
               <a:t>Fourth level</a:t>
             </a:r>
           </a:p>
           <a:p>
             <a:pPr lvl="4"/>
             <a:r>
-              <a:rPr lang="en-US" smtClean="0"/>
+              <a:rPr lang="en-US"/>
               <a:t>Fifth level</a:t>
             </a:r>
-            <a:endParaRPr lang="en-US"/>
           </a:p>
         </p:txBody>
       </p:sp>
@@ -2678,7 +2665,7 @@
           <a:p>
             <a:fld id="{2019D7E9-D108-4FE4-8462-55C3BE1817A8}" type="datetimeFigureOut">
               <a:rPr lang="en-US" smtClean="0"/>
-              <a:t>11/15/2017</a:t>
+              <a:t>11/21/2017</a:t>
             </a:fld>
             <a:endParaRPr lang="en-US"/>
           </a:p>
@@ -2772,10 +2759,9 @@
           <a:lstStyle/>
           <a:p>
             <a:r>
-              <a:rPr lang="en-US" smtClean="0"/>
+              <a:rPr lang="en-US"/>
               <a:t>Click to edit Master title style</a:t>
             </a:r>
-            <a:endParaRPr lang="en-US"/>
           </a:p>
         </p:txBody>
       </p:sp>
@@ -2796,7 +2782,7 @@
           <a:p>
             <a:fld id="{2019D7E9-D108-4FE4-8462-55C3BE1817A8}" type="datetimeFigureOut">
               <a:rPr lang="en-US" smtClean="0"/>
-              <a:t>11/15/2017</a:t>
+              <a:t>11/21/2017</a:t>
             </a:fld>
             <a:endParaRPr lang="en-US"/>
           </a:p>
@@ -2891,7 +2877,7 @@
           <a:p>
             <a:fld id="{2019D7E9-D108-4FE4-8462-55C3BE1817A8}" type="datetimeFigureOut">
               <a:rPr lang="en-US" smtClean="0"/>
-              <a:t>11/15/2017</a:t>
+              <a:t>11/21/2017</a:t>
             </a:fld>
             <a:endParaRPr lang="en-US"/>
           </a:p>
@@ -2994,10 +2980,9 @@
           </a:lstStyle>
           <a:p>
             <a:r>
-              <a:rPr lang="en-US" smtClean="0"/>
+              <a:rPr lang="en-US"/>
               <a:t>Click to edit Master title style</a:t>
             </a:r>
-            <a:endParaRPr lang="en-US"/>
           </a:p>
         </p:txBody>
       </p:sp>
@@ -3051,38 +3036,37 @@
           <a:p>
             <a:pPr lvl="0"/>
             <a:r>
-              <a:rPr lang="en-US" smtClean="0"/>
+              <a:rPr lang="en-US"/>
               <a:t>Click to edit Master text styles</a:t>
             </a:r>
           </a:p>
           <a:p>
             <a:pPr lvl="1"/>
             <a:r>
-              <a:rPr lang="en-US" smtClean="0"/>
+              <a:rPr lang="en-US"/>
               <a:t>Second level</a:t>
             </a:r>
           </a:p>
           <a:p>
             <a:pPr lvl="2"/>
             <a:r>
-              <a:rPr lang="en-US" smtClean="0"/>
+              <a:rPr lang="en-US"/>
               <a:t>Third level</a:t>
             </a:r>
           </a:p>
           <a:p>
             <a:pPr lvl="3"/>
             <a:r>
-              <a:rPr lang="en-US" smtClean="0"/>
+              <a:rPr lang="en-US"/>
               <a:t>Fourth level</a:t>
             </a:r>
           </a:p>
           <a:p>
             <a:pPr lvl="4"/>
             <a:r>
-              <a:rPr lang="en-US" smtClean="0"/>
+              <a:rPr lang="en-US"/>
               <a:t>Fifth level</a:t>
             </a:r>
-            <a:endParaRPr lang="en-US"/>
           </a:p>
         </p:txBody>
       </p:sp>
@@ -3145,7 +3129,7 @@
           <a:p>
             <a:pPr lvl="0"/>
             <a:r>
-              <a:rPr lang="en-US" smtClean="0"/>
+              <a:rPr lang="en-US"/>
               <a:t>Click to edit Master text styles</a:t>
             </a:r>
           </a:p>
@@ -3168,7 +3152,7 @@
           <a:p>
             <a:fld id="{2019D7E9-D108-4FE4-8462-55C3BE1817A8}" type="datetimeFigureOut">
               <a:rPr lang="en-US" smtClean="0"/>
-              <a:t>11/15/2017</a:t>
+              <a:t>11/21/2017</a:t>
             </a:fld>
             <a:endParaRPr lang="en-US"/>
           </a:p>
@@ -3271,10 +3255,9 @@
           </a:lstStyle>
           <a:p>
             <a:r>
-              <a:rPr lang="en-US" smtClean="0"/>
+              <a:rPr lang="en-US"/>
               <a:t>Click to edit Master title style</a:t>
             </a:r>
-            <a:endParaRPr lang="en-US"/>
           </a:p>
         </p:txBody>
       </p:sp>
@@ -3398,7 +3381,7 @@
           <a:p>
             <a:pPr lvl="0"/>
             <a:r>
-              <a:rPr lang="en-US" smtClean="0"/>
+              <a:rPr lang="en-US"/>
               <a:t>Click to edit Master text styles</a:t>
             </a:r>
           </a:p>
@@ -3421,7 +3404,7 @@
           <a:p>
             <a:fld id="{2019D7E9-D108-4FE4-8462-55C3BE1817A8}" type="datetimeFigureOut">
               <a:rPr lang="en-US" smtClean="0"/>
-              <a:t>11/15/2017</a:t>
+              <a:t>11/21/2017</a:t>
             </a:fld>
             <a:endParaRPr lang="en-US"/>
           </a:p>
@@ -3530,10 +3513,9 @@
           <a:lstStyle/>
           <a:p>
             <a:r>
-              <a:rPr lang="en-US" smtClean="0"/>
+              <a:rPr lang="en-US"/>
               <a:t>Click to edit Master title style</a:t>
             </a:r>
-            <a:endParaRPr lang="en-US"/>
           </a:p>
         </p:txBody>
       </p:sp>
@@ -3564,38 +3546,37 @@
           <a:p>
             <a:pPr lvl="0"/>
             <a:r>
-              <a:rPr lang="en-US" smtClean="0"/>
+              <a:rPr lang="en-US"/>
               <a:t>Click to edit Master text styles</a:t>
             </a:r>
           </a:p>
           <a:p>
             <a:pPr lvl="1"/>
             <a:r>
-              <a:rPr lang="en-US" smtClean="0"/>
+              <a:rPr lang="en-US"/>
               <a:t>Second level</a:t>
             </a:r>
           </a:p>
           <a:p>
             <a:pPr lvl="2"/>
             <a:r>
-              <a:rPr lang="en-US" smtClean="0"/>
+              <a:rPr lang="en-US"/>
               <a:t>Third level</a:t>
             </a:r>
           </a:p>
           <a:p>
             <a:pPr lvl="3"/>
             <a:r>
-              <a:rPr lang="en-US" smtClean="0"/>
+              <a:rPr lang="en-US"/>
               <a:t>Fourth level</a:t>
             </a:r>
           </a:p>
           <a:p>
             <a:pPr lvl="4"/>
             <a:r>
-              <a:rPr lang="en-US" smtClean="0"/>
+              <a:rPr lang="en-US"/>
               <a:t>Fifth level</a:t>
             </a:r>
-            <a:endParaRPr lang="en-US"/>
           </a:p>
         </p:txBody>
       </p:sp>
@@ -3634,7 +3615,7 @@
           <a:p>
             <a:fld id="{2019D7E9-D108-4FE4-8462-55C3BE1817A8}" type="datetimeFigureOut">
               <a:rPr lang="en-US" smtClean="0"/>
-              <a:t>11/15/2017</a:t>
+              <a:t>11/21/2017</a:t>
             </a:fld>
             <a:endParaRPr lang="en-US"/>
           </a:p>
@@ -4025,10 +4006,9 @@
           <a:lstStyle/>
           <a:p>
             <a:r>
-              <a:rPr lang="en-US" dirty="0" smtClean="0"/>
+              <a:rPr lang="en-US" dirty="0"/>
               <a:t>F# For Data</a:t>
             </a:r>
-            <a:endParaRPr lang="en-US" dirty="0"/>
           </a:p>
         </p:txBody>
       </p:sp>
@@ -4048,26 +4028,25 @@
           <a:lstStyle/>
           <a:p>
             <a:r>
-              <a:rPr lang="en-US" dirty="0" err="1" smtClean="0"/>
+              <a:rPr lang="en-US" dirty="0" err="1"/>
               <a:t>PyData</a:t>
             </a:r>
             <a:r>
-              <a:rPr lang="en-US" dirty="0" smtClean="0"/>
+              <a:rPr lang="en-US" dirty="0"/>
               <a:t> NYC 11/29/2017</a:t>
             </a:r>
           </a:p>
           <a:p>
             <a:r>
-              <a:rPr lang="en-US" dirty="0" smtClean="0"/>
+              <a:rPr lang="en-US" dirty="0"/>
               <a:t>Jamie Dixon</a:t>
             </a:r>
           </a:p>
           <a:p>
             <a:r>
-              <a:rPr lang="en-US" dirty="0" smtClean="0"/>
-              <a:t>Tom Porter</a:t>
-            </a:r>
-            <a:endParaRPr lang="en-US" dirty="0"/>
+              <a:rPr lang="en-US" dirty="0"/>
+              <a:t>Thomas Porter</a:t>
+            </a:r>
           </a:p>
         </p:txBody>
       </p:sp>
@@ -4081,13 +4060,6 @@
   <p:clrMapOvr>
     <a:masterClrMapping/>
   </p:clrMapOvr>
-  <p:timing>
-    <p:tnLst>
-      <p:par>
-        <p:cTn id="1" dur="indefinite" restart="never" nodeType="tmRoot"/>
-      </p:par>
-    </p:tnLst>
-  </p:timing>
 </p:sld>
 </file>
 
@@ -4124,10 +4096,9 @@
           <a:lstStyle/>
           <a:p>
             <a:r>
-              <a:rPr lang="en-US" dirty="0" smtClean="0"/>
+              <a:rPr lang="en-US" dirty="0"/>
               <a:t>F# Type Providers</a:t>
             </a:r>
-            <a:endParaRPr lang="en-US" dirty="0"/>
           </a:p>
         </p:txBody>
       </p:sp>
@@ -4149,36 +4120,36 @@
           <a:lstStyle/>
           <a:p>
             <a:r>
-              <a:rPr lang="en-US" dirty="0" smtClean="0"/>
+              <a:rPr lang="en-US" dirty="0"/>
               <a:t>Declare a Type</a:t>
             </a:r>
           </a:p>
           <a:p>
             <a:pPr lvl="1"/>
             <a:r>
-              <a:rPr lang="en-US" dirty="0" smtClean="0"/>
+              <a:rPr lang="en-US" dirty="0"/>
               <a:t>type Stocks = </a:t>
             </a:r>
             <a:r>
-              <a:rPr lang="en-US" dirty="0" err="1" smtClean="0"/>
+              <a:rPr lang="en-US" dirty="0" err="1"/>
               <a:t>CsvProvider</a:t>
             </a:r>
             <a:r>
-              <a:rPr lang="en-US" dirty="0" smtClean="0"/>
+              <a:rPr lang="en-US" dirty="0"/>
               <a:t>&lt;</a:t>
             </a:r>
             <a:r>
-              <a:rPr lang="en-US" dirty="0" err="1" smtClean="0"/>
+              <a:rPr lang="en-US" dirty="0" err="1"/>
               <a:t>someUri</a:t>
             </a:r>
             <a:r>
-              <a:rPr lang="en-US" dirty="0" smtClean="0"/>
+              <a:rPr lang="en-US" dirty="0"/>
               <a:t>&gt;</a:t>
             </a:r>
           </a:p>
           <a:p>
             <a:r>
-              <a:rPr lang="en-US" dirty="0" smtClean="0"/>
+              <a:rPr lang="en-US" dirty="0"/>
               <a:t> Hydrate an Instance</a:t>
             </a:r>
           </a:p>
@@ -4186,54 +4157,15 @@
             <a:pPr lvl="1"/>
             <a:r>
               <a:rPr lang="en-US" dirty="0"/>
-              <a:t>l</a:t>
-            </a:r>
-            <a:r>
-              <a:rPr lang="en-US" dirty="0" smtClean="0"/>
-              <a:t>et </a:t>
-            </a:r>
-            <a:r>
-              <a:rPr lang="en-US" dirty="0" err="1" smtClean="0"/>
+              <a:t>let </a:t>
+            </a:r>
+            <a:r>
+              <a:rPr lang="en-US" dirty="0" err="1"/>
               <a:t>ibmStockData</a:t>
             </a:r>
             <a:r>
-              <a:rPr lang="en-US" dirty="0" smtClean="0"/>
+              <a:rPr lang="en-US" dirty="0"/>
               <a:t> = </a:t>
-            </a:r>
-            <a:r>
-              <a:rPr lang="en-US" dirty="0" err="1" smtClean="0"/>
-              <a:t>Stocks.Load</a:t>
-            </a:r>
-            <a:r>
-              <a:rPr lang="en-US" dirty="0" smtClean="0"/>
-              <a:t>(</a:t>
-            </a:r>
-            <a:r>
-              <a:rPr lang="en-US" dirty="0" err="1" smtClean="0"/>
-              <a:t>someUri</a:t>
-            </a:r>
-            <a:r>
-              <a:rPr lang="en-US" dirty="0" smtClean="0"/>
-              <a:t> + IBM)</a:t>
-            </a:r>
-          </a:p>
-          <a:p>
-            <a:pPr lvl="1"/>
-            <a:r>
-              <a:rPr lang="en-US" dirty="0"/>
-              <a:t>let </a:t>
-            </a:r>
-            <a:r>
-              <a:rPr lang="en-US" dirty="0" err="1" smtClean="0"/>
-              <a:t>aaplStockData</a:t>
-            </a:r>
-            <a:r>
-              <a:rPr lang="en-US" dirty="0" smtClean="0"/>
-              <a:t> </a:t>
-            </a:r>
-            <a:r>
-              <a:rPr lang="en-US" dirty="0"/>
-              <a:t>= </a:t>
             </a:r>
             <a:r>
               <a:rPr lang="en-US" dirty="0" err="1"/>
@@ -4249,35 +4181,66 @@
             </a:r>
             <a:r>
               <a:rPr lang="en-US" dirty="0"/>
+              <a:t> + IBM)</a:t>
+            </a:r>
+          </a:p>
+          <a:p>
+            <a:pPr lvl="1"/>
+            <a:r>
+              <a:rPr lang="en-US" dirty="0"/>
+              <a:t>let </a:t>
+            </a:r>
+            <a:r>
+              <a:rPr lang="en-US" dirty="0" err="1"/>
+              <a:t>aaplStockData</a:t>
+            </a:r>
+            <a:r>
+              <a:rPr lang="en-US" dirty="0"/>
+              <a:t> = </a:t>
+            </a:r>
+            <a:r>
+              <a:rPr lang="en-US" dirty="0" err="1"/>
+              <a:t>Stocks.Load</a:t>
+            </a:r>
+            <a:r>
+              <a:rPr lang="en-US" dirty="0"/>
+              <a:t>(</a:t>
+            </a:r>
+            <a:r>
+              <a:rPr lang="en-US" dirty="0" err="1"/>
+              <a:t>someUri</a:t>
+            </a:r>
+            <a:r>
+              <a:rPr lang="en-US" dirty="0"/>
               <a:t> + </a:t>
             </a:r>
             <a:r>
-              <a:rPr lang="en-US" dirty="0" err="1" smtClean="0"/>
+              <a:rPr lang="en-US" dirty="0" err="1"/>
               <a:t>AAPL</a:t>
             </a:r>
             <a:r>
-              <a:rPr lang="en-US" dirty="0" smtClean="0"/>
+              <a:rPr lang="en-US" dirty="0"/>
               <a:t>)</a:t>
             </a:r>
           </a:p>
           <a:p>
             <a:r>
-              <a:rPr lang="en-US" dirty="0" smtClean="0"/>
+              <a:rPr lang="en-US" dirty="0"/>
               <a:t>Traverse and Manipulate Instance</a:t>
             </a:r>
           </a:p>
           <a:p>
             <a:pPr lvl="1"/>
             <a:r>
-              <a:rPr lang="en-US" dirty="0" smtClean="0"/>
+              <a:rPr lang="en-US" dirty="0"/>
               <a:t>let data = </a:t>
             </a:r>
             <a:r>
-              <a:rPr lang="en-US" dirty="0" err="1" smtClean="0"/>
+              <a:rPr lang="en-US" dirty="0" err="1"/>
               <a:t>ibmStockData.Rows</a:t>
             </a:r>
             <a:r>
-              <a:rPr lang="en-US" dirty="0" smtClean="0"/>
+              <a:rPr lang="en-US" dirty="0"/>
               <a:t> </a:t>
             </a:r>
           </a:p>
@@ -4287,13 +4250,8 @@
             </a:pPr>
             <a:r>
               <a:rPr lang="en-US" dirty="0"/>
-              <a:t>	</a:t>
-            </a:r>
-            <a:r>
-              <a:rPr lang="en-US" dirty="0" smtClean="0"/>
-              <a:t>|&gt; Filter |&gt; Sort |&gt; Perry |&gt; Dodge |&gt; Spin</a:t>
-            </a:r>
-            <a:endParaRPr lang="en-US" dirty="0"/>
+              <a:t>	|&gt; Filter |&gt; Sort |&gt; Perry |&gt; Dodge |&gt; Spin</a:t>
+            </a:r>
           </a:p>
           <a:p>
             <a:pPr lvl="1"/>
@@ -4311,13 +4269,6 @@
   <p:clrMapOvr>
     <a:masterClrMapping/>
   </p:clrMapOvr>
-  <p:timing>
-    <p:tnLst>
-      <p:par>
-        <p:cTn id="1" dur="indefinite" restart="never" nodeType="tmRoot"/>
-      </p:par>
-    </p:tnLst>
-  </p:timing>
 </p:sld>
 </file>
 
@@ -4354,10 +4305,9 @@
           <a:lstStyle/>
           <a:p>
             <a:r>
-              <a:rPr lang="en-US" dirty="0" smtClean="0"/>
+              <a:rPr lang="en-US" dirty="0"/>
               <a:t>F# Type Providers</a:t>
             </a:r>
-            <a:endParaRPr lang="en-US" dirty="0"/>
           </a:p>
         </p:txBody>
       </p:sp>
@@ -4377,10 +4327,9 @@
           <a:lstStyle/>
           <a:p>
             <a:r>
-              <a:rPr lang="en-US" dirty="0" smtClean="0"/>
+              <a:rPr lang="en-US" dirty="0"/>
               <a:t>&lt;Demo /&gt;</a:t>
             </a:r>
-            <a:endParaRPr lang="en-US" dirty="0"/>
           </a:p>
         </p:txBody>
       </p:sp>
@@ -4394,13 +4343,6 @@
   <p:clrMapOvr>
     <a:masterClrMapping/>
   </p:clrMapOvr>
-  <p:timing>
-    <p:tnLst>
-      <p:par>
-        <p:cTn id="1" dur="indefinite" restart="never" nodeType="tmRoot"/>
-      </p:par>
-    </p:tnLst>
-  </p:timing>
 </p:sld>
 </file>
 
@@ -4437,10 +4379,9 @@
           <a:lstStyle/>
           <a:p>
             <a:r>
-              <a:rPr lang="en-US" dirty="0" smtClean="0"/>
+              <a:rPr lang="en-US" dirty="0"/>
               <a:t>F# Data Manipulation</a:t>
             </a:r>
-            <a:endParaRPr lang="en-US" dirty="0"/>
           </a:p>
         </p:txBody>
       </p:sp>
@@ -4460,53 +4401,53 @@
           <a:lstStyle/>
           <a:p>
             <a:r>
-              <a:rPr lang="en-US" dirty="0" smtClean="0"/>
+              <a:rPr lang="en-US" dirty="0"/>
               <a:t>F# Language uses high order functions for most data manipulation tasks</a:t>
             </a:r>
           </a:p>
           <a:p>
             <a:r>
-              <a:rPr lang="en-US" dirty="0" smtClean="0"/>
+              <a:rPr lang="en-US" dirty="0"/>
               <a:t>Can use Parallel library for parallel compute</a:t>
             </a:r>
           </a:p>
           <a:p>
             <a:r>
-              <a:rPr lang="en-US" i="1" dirty="0" err="1" smtClean="0"/>
+              <a:rPr lang="en-US" i="1" dirty="0" err="1"/>
               <a:t>Deedle</a:t>
             </a:r>
             <a:r>
-              <a:rPr lang="en-US" dirty="0" smtClean="0"/>
+              <a:rPr lang="en-US" dirty="0"/>
               <a:t> is for exploratory and time series analysis ~ </a:t>
             </a:r>
             <a:r>
-              <a:rPr lang="en-US" dirty="0" err="1" smtClean="0"/>
+              <a:rPr lang="en-US" dirty="0" err="1"/>
               <a:t>Equiv</a:t>
             </a:r>
             <a:r>
-              <a:rPr lang="en-US" dirty="0" smtClean="0"/>
+              <a:rPr lang="en-US" dirty="0"/>
               <a:t> to Pandas</a:t>
             </a:r>
           </a:p>
           <a:p>
             <a:r>
-              <a:rPr lang="en-US" i="1" dirty="0" err="1" smtClean="0"/>
+              <a:rPr lang="en-US" i="1" dirty="0" err="1"/>
               <a:t>MBrace</a:t>
             </a:r>
             <a:r>
-              <a:rPr lang="en-US" dirty="0" smtClean="0"/>
+              <a:rPr lang="en-US" dirty="0"/>
               <a:t> is for cross machine computation ~ </a:t>
             </a:r>
             <a:r>
-              <a:rPr lang="en-US" dirty="0" err="1" smtClean="0"/>
+              <a:rPr lang="en-US" dirty="0" err="1"/>
               <a:t>equiv</a:t>
             </a:r>
             <a:r>
-              <a:rPr lang="en-US" dirty="0" smtClean="0"/>
+              <a:rPr lang="en-US" dirty="0"/>
               <a:t> to </a:t>
             </a:r>
             <a:r>
-              <a:rPr lang="en-US" dirty="0" err="1" smtClean="0"/>
+              <a:rPr lang="en-US" dirty="0" err="1"/>
               <a:t>hadoop</a:t>
             </a:r>
             <a:endParaRPr lang="en-US" dirty="0"/>
@@ -4523,13 +4464,6 @@
   <p:clrMapOvr>
     <a:masterClrMapping/>
   </p:clrMapOvr>
-  <p:timing>
-    <p:tnLst>
-      <p:par>
-        <p:cTn id="1" dur="indefinite" restart="never" nodeType="tmRoot"/>
-      </p:par>
-    </p:tnLst>
-  </p:timing>
 </p:sld>
 </file>
 
@@ -4566,10 +4500,9 @@
           <a:lstStyle/>
           <a:p>
             <a:r>
-              <a:rPr lang="en-US" dirty="0" smtClean="0"/>
+              <a:rPr lang="en-US" dirty="0"/>
               <a:t>F# Data Manipulation</a:t>
             </a:r>
-            <a:endParaRPr lang="en-US" dirty="0"/>
           </a:p>
         </p:txBody>
       </p:sp>
@@ -4589,88 +4522,74 @@
           <a:lstStyle/>
           <a:p>
             <a:r>
-              <a:rPr lang="en-US" dirty="0" smtClean="0"/>
-              <a:t>High Order Functions</a:t>
-            </a:r>
-            <a:r>
-              <a:rPr lang="en-US" dirty="0"/>
-              <a:t> </a:t>
-            </a:r>
-            <a:r>
-              <a:rPr lang="en-US" dirty="0" smtClean="0"/>
-              <a:t>are functions that take in other functions as arguments</a:t>
+              <a:rPr lang="en-US" dirty="0"/>
+              <a:t>High Order Functions are functions that take in other functions as arguments</a:t>
             </a:r>
           </a:p>
           <a:p>
             <a:pPr lvl="1"/>
             <a:r>
-              <a:rPr lang="en-US" dirty="0" smtClean="0"/>
+              <a:rPr lang="en-US" dirty="0"/>
               <a:t>Seen with Lambdas: </a:t>
             </a:r>
             <a:r>
-              <a:rPr lang="en-US" dirty="0" err="1" smtClean="0"/>
+              <a:rPr lang="en-US" dirty="0" err="1"/>
               <a:t>Seq.Map</a:t>
             </a:r>
             <a:r>
-              <a:rPr lang="en-US" dirty="0" smtClean="0"/>
+              <a:rPr lang="en-US" dirty="0"/>
               <a:t>(fun x -&gt; x + 1)</a:t>
             </a:r>
           </a:p>
           <a:p>
             <a:pPr lvl="1"/>
             <a:r>
-              <a:rPr lang="en-US" dirty="0" smtClean="0"/>
-              <a:t>Can be a named function:</a:t>
-            </a:r>
-            <a:r>
-              <a:rPr lang="en-US" dirty="0"/>
-              <a:t> </a:t>
-            </a:r>
-            <a:endParaRPr lang="en-US" dirty="0" smtClean="0"/>
+              <a:rPr lang="en-US" dirty="0"/>
+              <a:t>Can be a named function: </a:t>
+            </a:r>
           </a:p>
           <a:p>
             <a:pPr marL="914400" lvl="2" indent="0">
               <a:buNone/>
             </a:pPr>
             <a:r>
-              <a:rPr lang="en-US" dirty="0" smtClean="0"/>
+              <a:rPr lang="en-US" dirty="0"/>
               <a:t>let </a:t>
             </a:r>
             <a:r>
-              <a:rPr lang="en-US" dirty="0" err="1" smtClean="0"/>
+              <a:rPr lang="en-US" dirty="0" err="1"/>
               <a:t>addOne</a:t>
             </a:r>
             <a:r>
-              <a:rPr lang="en-US" dirty="0" smtClean="0"/>
+              <a:rPr lang="en-US" dirty="0"/>
               <a:t> x = x + 1</a:t>
             </a:r>
-            <a:endParaRPr lang="en-US" dirty="0"/>
           </a:p>
           <a:p>
             <a:pPr marL="914400" lvl="2" indent="0">
               <a:buNone/>
             </a:pPr>
             <a:r>
-              <a:rPr lang="en-US" dirty="0" err="1" smtClean="0"/>
+              <a:rPr lang="en-US" dirty="0" err="1"/>
               <a:t>Seq.Map</a:t>
             </a:r>
             <a:r>
-              <a:rPr lang="en-US" dirty="0" smtClean="0"/>
+              <a:rPr lang="en-US" dirty="0"/>
               <a:t>(</a:t>
             </a:r>
             <a:r>
-              <a:rPr lang="en-US" dirty="0" err="1" smtClean="0"/>
+              <a:rPr lang="en-US" dirty="0" err="1"/>
               <a:t>addOne</a:t>
             </a:r>
             <a:r>
-              <a:rPr lang="en-US" dirty="0" smtClean="0"/>
+              <a:rPr lang="en-US" dirty="0"/>
               <a:t>)</a:t>
             </a:r>
           </a:p>
           <a:p>
             <a:pPr lvl="1"/>
             <a:r>
-              <a:rPr lang="en-US" dirty="0" smtClean="0"/>
+              <a:rPr lang="en-US" dirty="0"/>
               <a:t>Can have more than 1 parameter</a:t>
             </a:r>
           </a:p>
@@ -4679,27 +4598,27 @@
               <a:buNone/>
             </a:pPr>
             <a:r>
-              <a:rPr lang="en-US" dirty="0" err="1" smtClean="0"/>
+              <a:rPr lang="en-US" dirty="0" err="1"/>
               <a:t>Seq.mapi</a:t>
             </a:r>
             <a:r>
-              <a:rPr lang="en-US" dirty="0" smtClean="0"/>
+              <a:rPr lang="en-US" dirty="0"/>
               <a:t>(fun </a:t>
             </a:r>
             <a:r>
-              <a:rPr lang="en-US" dirty="0" err="1" smtClean="0"/>
+              <a:rPr lang="en-US" dirty="0" err="1"/>
               <a:t>idx</a:t>
             </a:r>
             <a:r>
-              <a:rPr lang="en-US" dirty="0" smtClean="0"/>
+              <a:rPr lang="en-US" dirty="0"/>
               <a:t> x -&gt; </a:t>
             </a:r>
             <a:r>
-              <a:rPr lang="en-US" dirty="0" err="1" smtClean="0"/>
+              <a:rPr lang="en-US" dirty="0" err="1"/>
               <a:t>idx</a:t>
             </a:r>
             <a:r>
-              <a:rPr lang="en-US" dirty="0" smtClean="0"/>
+              <a:rPr lang="en-US" dirty="0"/>
               <a:t> + x)</a:t>
             </a:r>
           </a:p>
@@ -4715,13 +4634,6 @@
   <p:clrMapOvr>
     <a:masterClrMapping/>
   </p:clrMapOvr>
-  <p:timing>
-    <p:tnLst>
-      <p:par>
-        <p:cTn id="1" dur="indefinite" restart="never" nodeType="tmRoot"/>
-      </p:par>
-    </p:tnLst>
-  </p:timing>
 </p:sld>
 </file>
 
@@ -4758,10 +4670,9 @@
           <a:lstStyle/>
           <a:p>
             <a:r>
-              <a:rPr lang="en-US" dirty="0" smtClean="0"/>
+              <a:rPr lang="en-US" dirty="0"/>
               <a:t>F# Data Manipulation</a:t>
             </a:r>
-            <a:endParaRPr lang="en-US" dirty="0"/>
           </a:p>
         </p:txBody>
       </p:sp>
@@ -4781,10 +4692,9 @@
           <a:lstStyle/>
           <a:p>
             <a:r>
-              <a:rPr lang="en-US" dirty="0" smtClean="0"/>
+              <a:rPr lang="en-US" dirty="0"/>
               <a:t>&lt;Demo /&gt;</a:t>
             </a:r>
-            <a:endParaRPr lang="en-US" dirty="0"/>
           </a:p>
         </p:txBody>
       </p:sp>
@@ -4798,13 +4708,6 @@
   <p:clrMapOvr>
     <a:masterClrMapping/>
   </p:clrMapOvr>
-  <p:timing>
-    <p:tnLst>
-      <p:par>
-        <p:cTn id="1" dur="indefinite" restart="never" nodeType="tmRoot"/>
-      </p:par>
-    </p:tnLst>
-  </p:timing>
 </p:sld>
 </file>
 
@@ -4841,10 +4744,9 @@
           <a:lstStyle/>
           <a:p>
             <a:r>
-              <a:rPr lang="en-US" dirty="0" smtClean="0"/>
+              <a:rPr lang="en-US" dirty="0"/>
               <a:t>F# Data Manipulation: Group By</a:t>
             </a:r>
-            <a:endParaRPr lang="en-US" dirty="0"/>
           </a:p>
         </p:txBody>
       </p:sp>
@@ -4873,21 +4775,111 @@
                 <a:tableStyleId>{5C22544A-7EE6-4342-B048-85BDC9FD1C3A}</a:tableStyleId>
               </a:tblPr>
               <a:tblGrid>
-                <a:gridCol w="703867"/>
-                <a:gridCol w="703867"/>
-                <a:gridCol w="570221"/>
-                <a:gridCol w="570221"/>
-                <a:gridCol w="308870"/>
-                <a:gridCol w="570221"/>
-                <a:gridCol w="570221"/>
-                <a:gridCol w="570221"/>
-                <a:gridCol w="570221"/>
-                <a:gridCol w="570221"/>
-                <a:gridCol w="240563"/>
-                <a:gridCol w="570221"/>
-                <a:gridCol w="570221"/>
-                <a:gridCol w="570221"/>
-                <a:gridCol w="570221"/>
+                <a:gridCol w="703867">
+                  <a:extLst>
+                    <a:ext uri="{9D8B030D-6E8A-4147-A177-3AD203B41FA5}">
+                      <a16:colId xmlns:a16="http://schemas.microsoft.com/office/drawing/2014/main" val="20000"/>
+                    </a:ext>
+                  </a:extLst>
+                </a:gridCol>
+                <a:gridCol w="703867">
+                  <a:extLst>
+                    <a:ext uri="{9D8B030D-6E8A-4147-A177-3AD203B41FA5}">
+                      <a16:colId xmlns:a16="http://schemas.microsoft.com/office/drawing/2014/main" val="20001"/>
+                    </a:ext>
+                  </a:extLst>
+                </a:gridCol>
+                <a:gridCol w="570221">
+                  <a:extLst>
+                    <a:ext uri="{9D8B030D-6E8A-4147-A177-3AD203B41FA5}">
+                      <a16:colId xmlns:a16="http://schemas.microsoft.com/office/drawing/2014/main" val="20002"/>
+                    </a:ext>
+                  </a:extLst>
+                </a:gridCol>
+                <a:gridCol w="570221">
+                  <a:extLst>
+                    <a:ext uri="{9D8B030D-6E8A-4147-A177-3AD203B41FA5}">
+                      <a16:colId xmlns:a16="http://schemas.microsoft.com/office/drawing/2014/main" val="20003"/>
+                    </a:ext>
+                  </a:extLst>
+                </a:gridCol>
+                <a:gridCol w="308870">
+                  <a:extLst>
+                    <a:ext uri="{9D8B030D-6E8A-4147-A177-3AD203B41FA5}">
+                      <a16:colId xmlns:a16="http://schemas.microsoft.com/office/drawing/2014/main" val="20004"/>
+                    </a:ext>
+                  </a:extLst>
+                </a:gridCol>
+                <a:gridCol w="570221">
+                  <a:extLst>
+                    <a:ext uri="{9D8B030D-6E8A-4147-A177-3AD203B41FA5}">
+                      <a16:colId xmlns:a16="http://schemas.microsoft.com/office/drawing/2014/main" val="20005"/>
+                    </a:ext>
+                  </a:extLst>
+                </a:gridCol>
+                <a:gridCol w="570221">
+                  <a:extLst>
+                    <a:ext uri="{9D8B030D-6E8A-4147-A177-3AD203B41FA5}">
+                      <a16:colId xmlns:a16="http://schemas.microsoft.com/office/drawing/2014/main" val="20006"/>
+                    </a:ext>
+                  </a:extLst>
+                </a:gridCol>
+                <a:gridCol w="570221">
+                  <a:extLst>
+                    <a:ext uri="{9D8B030D-6E8A-4147-A177-3AD203B41FA5}">
+                      <a16:colId xmlns:a16="http://schemas.microsoft.com/office/drawing/2014/main" val="20007"/>
+                    </a:ext>
+                  </a:extLst>
+                </a:gridCol>
+                <a:gridCol w="570221">
+                  <a:extLst>
+                    <a:ext uri="{9D8B030D-6E8A-4147-A177-3AD203B41FA5}">
+                      <a16:colId xmlns:a16="http://schemas.microsoft.com/office/drawing/2014/main" val="20008"/>
+                    </a:ext>
+                  </a:extLst>
+                </a:gridCol>
+                <a:gridCol w="570221">
+                  <a:extLst>
+                    <a:ext uri="{9D8B030D-6E8A-4147-A177-3AD203B41FA5}">
+                      <a16:colId xmlns:a16="http://schemas.microsoft.com/office/drawing/2014/main" val="20009"/>
+                    </a:ext>
+                  </a:extLst>
+                </a:gridCol>
+                <a:gridCol w="240563">
+                  <a:extLst>
+                    <a:ext uri="{9D8B030D-6E8A-4147-A177-3AD203B41FA5}">
+                      <a16:colId xmlns:a16="http://schemas.microsoft.com/office/drawing/2014/main" val="20010"/>
+                    </a:ext>
+                  </a:extLst>
+                </a:gridCol>
+                <a:gridCol w="570221">
+                  <a:extLst>
+                    <a:ext uri="{9D8B030D-6E8A-4147-A177-3AD203B41FA5}">
+                      <a16:colId xmlns:a16="http://schemas.microsoft.com/office/drawing/2014/main" val="20011"/>
+                    </a:ext>
+                  </a:extLst>
+                </a:gridCol>
+                <a:gridCol w="570221">
+                  <a:extLst>
+                    <a:ext uri="{9D8B030D-6E8A-4147-A177-3AD203B41FA5}">
+                      <a16:colId xmlns:a16="http://schemas.microsoft.com/office/drawing/2014/main" val="20012"/>
+                    </a:ext>
+                  </a:extLst>
+                </a:gridCol>
+                <a:gridCol w="570221">
+                  <a:extLst>
+                    <a:ext uri="{9D8B030D-6E8A-4147-A177-3AD203B41FA5}">
+                      <a16:colId xmlns:a16="http://schemas.microsoft.com/office/drawing/2014/main" val="20013"/>
+                    </a:ext>
+                  </a:extLst>
+                </a:gridCol>
+                <a:gridCol w="570221">
+                  <a:extLst>
+                    <a:ext uri="{9D8B030D-6E8A-4147-A177-3AD203B41FA5}">
+                      <a16:colId xmlns:a16="http://schemas.microsoft.com/office/drawing/2014/main" val="20014"/>
+                    </a:ext>
+                  </a:extLst>
+                </a:gridCol>
               </a:tblGrid>
               <a:tr h="322881">
                 <a:tc>
@@ -5114,6 +5106,11 @@
                   </a:txBody>
                   <a:tcPr/>
                 </a:tc>
+                <a:extLst>
+                  <a:ext uri="{0D108BD9-81ED-4DB2-BD59-A6C34878D82A}">
+                    <a16:rowId xmlns:a16="http://schemas.microsoft.com/office/drawing/2014/main" val="10000"/>
+                  </a:ext>
+                </a:extLst>
               </a:tr>
               <a:tr h="322881">
                 <a:tc>
@@ -5398,6 +5395,11 @@
                   </a:txBody>
                   <a:tcPr marL="8919" marR="8919" marT="8919" marB="0" anchor="b"/>
                 </a:tc>
+                <a:extLst>
+                  <a:ext uri="{0D108BD9-81ED-4DB2-BD59-A6C34878D82A}">
+                    <a16:rowId xmlns:a16="http://schemas.microsoft.com/office/drawing/2014/main" val="10001"/>
+                  </a:ext>
+                </a:extLst>
               </a:tr>
               <a:tr h="322881">
                 <a:tc>
@@ -5721,6 +5723,11 @@
                   </a:txBody>
                   <a:tcPr marL="8919" marR="8919" marT="8919" marB="0" anchor="b"/>
                 </a:tc>
+                <a:extLst>
+                  <a:ext uri="{0D108BD9-81ED-4DB2-BD59-A6C34878D82A}">
+                    <a16:rowId xmlns:a16="http://schemas.microsoft.com/office/drawing/2014/main" val="10002"/>
+                  </a:ext>
+                </a:extLst>
               </a:tr>
               <a:tr h="178387">
                 <a:tc>
@@ -6044,6 +6051,11 @@
                   </a:txBody>
                   <a:tcPr marL="8919" marR="8919" marT="8919" marB="0" anchor="b"/>
                 </a:tc>
+                <a:extLst>
+                  <a:ext uri="{0D108BD9-81ED-4DB2-BD59-A6C34878D82A}">
+                    <a16:rowId xmlns:a16="http://schemas.microsoft.com/office/drawing/2014/main" val="10003"/>
+                  </a:ext>
+                </a:extLst>
               </a:tr>
               <a:tr h="178387">
                 <a:tc>
@@ -6349,6 +6361,11 @@
                   </a:txBody>
                   <a:tcPr marL="8919" marR="8919" marT="8919" marB="0" anchor="b"/>
                 </a:tc>
+                <a:extLst>
+                  <a:ext uri="{0D108BD9-81ED-4DB2-BD59-A6C34878D82A}">
+                    <a16:rowId xmlns:a16="http://schemas.microsoft.com/office/drawing/2014/main" val="10004"/>
+                  </a:ext>
+                </a:extLst>
               </a:tr>
               <a:tr h="178387">
                 <a:tc>
@@ -6639,6 +6656,11 @@
                   </a:txBody>
                   <a:tcPr/>
                 </a:tc>
+                <a:extLst>
+                  <a:ext uri="{0D108BD9-81ED-4DB2-BD59-A6C34878D82A}">
+                    <a16:rowId xmlns:a16="http://schemas.microsoft.com/office/drawing/2014/main" val="10005"/>
+                  </a:ext>
+                </a:extLst>
               </a:tr>
               <a:tr h="178387">
                 <a:tc>
@@ -6944,6 +6966,11 @@
                   </a:txBody>
                   <a:tcPr marL="8919" marR="8919" marT="8919" marB="0" anchor="b"/>
                 </a:tc>
+                <a:extLst>
+                  <a:ext uri="{0D108BD9-81ED-4DB2-BD59-A6C34878D82A}">
+                    <a16:rowId xmlns:a16="http://schemas.microsoft.com/office/drawing/2014/main" val="10006"/>
+                  </a:ext>
+                </a:extLst>
               </a:tr>
               <a:tr h="178387">
                 <a:tc>
@@ -7255,6 +7282,11 @@
                   </a:txBody>
                   <a:tcPr marL="8919" marR="8919" marT="8919" marB="0" anchor="b"/>
                 </a:tc>
+                <a:extLst>
+                  <a:ext uri="{0D108BD9-81ED-4DB2-BD59-A6C34878D82A}">
+                    <a16:rowId xmlns:a16="http://schemas.microsoft.com/office/drawing/2014/main" val="10007"/>
+                  </a:ext>
+                </a:extLst>
               </a:tr>
               <a:tr h="178387">
                 <a:tc>
@@ -7560,6 +7592,11 @@
                   </a:txBody>
                   <a:tcPr marL="8919" marR="8919" marT="8919" marB="0" anchor="b"/>
                 </a:tc>
+                <a:extLst>
+                  <a:ext uri="{0D108BD9-81ED-4DB2-BD59-A6C34878D82A}">
+                    <a16:rowId xmlns:a16="http://schemas.microsoft.com/office/drawing/2014/main" val="10008"/>
+                  </a:ext>
+                </a:extLst>
               </a:tr>
               <a:tr h="178387">
                 <a:tc>
@@ -7865,6 +7902,11 @@
                   </a:txBody>
                   <a:tcPr marL="8919" marR="8919" marT="8919" marB="0" anchor="b"/>
                 </a:tc>
+                <a:extLst>
+                  <a:ext uri="{0D108BD9-81ED-4DB2-BD59-A6C34878D82A}">
+                    <a16:rowId xmlns:a16="http://schemas.microsoft.com/office/drawing/2014/main" val="10009"/>
+                  </a:ext>
+                </a:extLst>
               </a:tr>
               <a:tr h="178387">
                 <a:tc>
@@ -8170,6 +8212,11 @@
                   </a:txBody>
                   <a:tcPr marL="8919" marR="8919" marT="8919" marB="0" anchor="b"/>
                 </a:tc>
+                <a:extLst>
+                  <a:ext uri="{0D108BD9-81ED-4DB2-BD59-A6C34878D82A}">
+                    <a16:rowId xmlns:a16="http://schemas.microsoft.com/office/drawing/2014/main" val="10010"/>
+                  </a:ext>
+                </a:extLst>
               </a:tr>
               <a:tr h="178387">
                 <a:tc>
@@ -8451,6 +8498,11 @@
                   </a:txBody>
                   <a:tcPr marL="8919" marR="8919" marT="8919" marB="0" anchor="b"/>
                 </a:tc>
+                <a:extLst>
+                  <a:ext uri="{0D108BD9-81ED-4DB2-BD59-A6C34878D82A}">
+                    <a16:rowId xmlns:a16="http://schemas.microsoft.com/office/drawing/2014/main" val="10011"/>
+                  </a:ext>
+                </a:extLst>
               </a:tr>
               <a:tr h="178387">
                 <a:tc gridSpan="2">
@@ -8707,6 +8759,11 @@
                   </a:txBody>
                   <a:tcPr marL="8919" marR="8919" marT="8919" marB="0" anchor="b"/>
                 </a:tc>
+                <a:extLst>
+                  <a:ext uri="{0D108BD9-81ED-4DB2-BD59-A6C34878D82A}">
+                    <a16:rowId xmlns:a16="http://schemas.microsoft.com/office/drawing/2014/main" val="10012"/>
+                  </a:ext>
+                </a:extLst>
               </a:tr>
               <a:tr h="178387">
                 <a:tc>
@@ -8963,6 +9020,11 @@
                   </a:txBody>
                   <a:tcPr marL="8919" marR="8919" marT="8919" marB="0" anchor="b"/>
                 </a:tc>
+                <a:extLst>
+                  <a:ext uri="{0D108BD9-81ED-4DB2-BD59-A6C34878D82A}">
+                    <a16:rowId xmlns:a16="http://schemas.microsoft.com/office/drawing/2014/main" val="10013"/>
+                  </a:ext>
+                </a:extLst>
               </a:tr>
               <a:tr h="178387">
                 <a:tc>
@@ -9205,6 +9267,11 @@
                   </a:txBody>
                   <a:tcPr marL="8919" marR="8919" marT="8919" marB="0" anchor="b"/>
                 </a:tc>
+                <a:extLst>
+                  <a:ext uri="{0D108BD9-81ED-4DB2-BD59-A6C34878D82A}">
+                    <a16:rowId xmlns:a16="http://schemas.microsoft.com/office/drawing/2014/main" val="10014"/>
+                  </a:ext>
+                </a:extLst>
               </a:tr>
             </a:tbl>
           </a:graphicData>
@@ -9220,13 +9287,6 @@
   <p:clrMapOvr>
     <a:masterClrMapping/>
   </p:clrMapOvr>
-  <p:timing>
-    <p:tnLst>
-      <p:par>
-        <p:cTn id="1" dur="indefinite" restart="never" nodeType="tmRoot"/>
-      </p:par>
-    </p:tnLst>
-  </p:timing>
 </p:sld>
 </file>
 
@@ -9263,10 +9323,9 @@
           <a:lstStyle/>
           <a:p>
             <a:r>
-              <a:rPr lang="en-US" dirty="0" smtClean="0"/>
+              <a:rPr lang="en-US" dirty="0"/>
               <a:t>F# Data Validation</a:t>
             </a:r>
-            <a:endParaRPr lang="en-US" dirty="0"/>
           </a:p>
         </p:txBody>
       </p:sp>
@@ -9286,19 +9345,19 @@
           <a:lstStyle/>
           <a:p>
             <a:r>
-              <a:rPr lang="en-US" dirty="0" smtClean="0"/>
+              <a:rPr lang="en-US" dirty="0"/>
               <a:t>Monads are a great way to control side-effects and reduce errors in your code</a:t>
             </a:r>
           </a:p>
           <a:p>
             <a:r>
-              <a:rPr lang="en-US" dirty="0" smtClean="0"/>
+              <a:rPr lang="en-US" dirty="0"/>
               <a:t>“Learn You Some Haskell” is a great book to get an in-depth understanding of them</a:t>
             </a:r>
           </a:p>
           <a:p>
             <a:r>
-              <a:rPr lang="en-US" dirty="0" smtClean="0"/>
+              <a:rPr lang="en-US" dirty="0"/>
               <a:t>We are using the Bind Monad to handle control of flow</a:t>
             </a:r>
           </a:p>
@@ -9313,7 +9372,6 @@
               <a:rPr lang="en-US" i="1" dirty="0"/>
               <a:t>https://fsharpforfunandprofit.com/rop/</a:t>
             </a:r>
-            <a:endParaRPr lang="en-US" i="1" dirty="0"/>
           </a:p>
         </p:txBody>
       </p:sp>
@@ -9327,13 +9385,6 @@
   <p:clrMapOvr>
     <a:masterClrMapping/>
   </p:clrMapOvr>
-  <p:timing>
-    <p:tnLst>
-      <p:par>
-        <p:cTn id="1" dur="indefinite" restart="never" nodeType="tmRoot"/>
-      </p:par>
-    </p:tnLst>
-  </p:timing>
 </p:sld>
 </file>
 
@@ -9404,10 +9455,9 @@
           <a:lstStyle/>
           <a:p>
             <a:r>
-              <a:rPr lang="en-US" dirty="0" smtClean="0"/>
+              <a:rPr lang="en-US" dirty="0"/>
               <a:t>In OO, methods branch and then return on the happy path while exceptions are thrown to “short circuit” control of flow</a:t>
             </a:r>
-            <a:endParaRPr lang="en-US" dirty="0"/>
           </a:p>
         </p:txBody>
       </p:sp>
@@ -9448,10 +9498,9 @@
           <a:p>
             <a:pPr algn="ctr"/>
             <a:r>
-              <a:rPr lang="en-US" dirty="0" smtClean="0"/>
+              <a:rPr lang="en-US" dirty="0"/>
               <a:t>Method 1</a:t>
             </a:r>
-            <a:endParaRPr lang="en-US" dirty="0"/>
           </a:p>
         </p:txBody>
       </p:sp>
@@ -9539,10 +9588,9 @@
           <a:p>
             <a:pPr algn="ctr"/>
             <a:r>
-              <a:rPr lang="en-US" dirty="0" smtClean="0"/>
+              <a:rPr lang="en-US" dirty="0"/>
               <a:t>Method 2</a:t>
             </a:r>
-            <a:endParaRPr lang="en-US" dirty="0"/>
           </a:p>
         </p:txBody>
       </p:sp>
@@ -9630,10 +9678,9 @@
           <a:p>
             <a:pPr algn="ctr"/>
             <a:r>
-              <a:rPr lang="en-US" dirty="0" smtClean="0"/>
+              <a:rPr lang="en-US" dirty="0"/>
               <a:t>Method 3</a:t>
             </a:r>
-            <a:endParaRPr lang="en-US" dirty="0"/>
           </a:p>
         </p:txBody>
       </p:sp>
@@ -9721,10 +9768,9 @@
           <a:p>
             <a:pPr algn="ctr"/>
             <a:r>
-              <a:rPr lang="en-US" dirty="0" smtClean="0"/>
+              <a:rPr lang="en-US" dirty="0"/>
               <a:t>Method 4</a:t>
             </a:r>
-            <a:endParaRPr lang="en-US" dirty="0"/>
           </a:p>
         </p:txBody>
       </p:sp>
@@ -9953,10 +9999,9 @@
           <a:p>
             <a:pPr algn="ctr"/>
             <a:r>
-              <a:rPr lang="en-US" dirty="0" smtClean="0"/>
-              <a:t>Method 5</a:t>
-            </a:r>
-            <a:endParaRPr lang="en-US" dirty="0"/>
+              <a:rPr lang="en-US" dirty="0"/>
+              <a:t>Method 6</a:t>
+            </a:r>
           </a:p>
         </p:txBody>
       </p:sp>
@@ -9997,10 +10042,9 @@
           <a:p>
             <a:pPr algn="ctr"/>
             <a:r>
-              <a:rPr lang="en-US" dirty="0" smtClean="0"/>
+              <a:rPr lang="en-US" dirty="0"/>
               <a:t>Method 5</a:t>
             </a:r>
-            <a:endParaRPr lang="en-US" dirty="0"/>
           </a:p>
         </p:txBody>
       </p:sp>
@@ -10202,13 +10246,6 @@
   <p:clrMapOvr>
     <a:masterClrMapping/>
   </p:clrMapOvr>
-  <p:timing>
-    <p:tnLst>
-      <p:par>
-        <p:cTn id="1" dur="indefinite" restart="never" nodeType="tmRoot"/>
-      </p:par>
-    </p:tnLst>
-  </p:timing>
 </p:sld>
 </file>
 
@@ -10317,18 +10354,9 @@
           <a:lstStyle/>
           <a:p>
             <a:r>
-              <a:rPr lang="en-US" dirty="0" smtClean="0"/>
-              <a:t>Using Monads, we only have direction - forward. </a:t>
-            </a:r>
-            <a:r>
-              <a:rPr lang="en-US" dirty="0"/>
-              <a:t>There is 1 </a:t>
-            </a:r>
-            <a:r>
-              <a:rPr lang="en-US" dirty="0" smtClean="0"/>
-              <a:t>path for happy path, 1 for exceptions/errors Functions are “glued” together to form larger functions.   </a:t>
-            </a:r>
-            <a:endParaRPr lang="en-US" dirty="0"/>
+              <a:rPr lang="en-US" dirty="0"/>
+              <a:t>Using Monads, we only have direction - forward. There is 1 path for happy path, 1 for exceptions/errors Functions are “glued” together to form larger functions.   </a:t>
+            </a:r>
           </a:p>
         </p:txBody>
       </p:sp>
@@ -10369,10 +10397,9 @@
           <a:p>
             <a:pPr algn="ctr"/>
             <a:r>
-              <a:rPr lang="en-US" dirty="0" smtClean="0"/>
+              <a:rPr lang="en-US" dirty="0"/>
               <a:t>Function1</a:t>
             </a:r>
-            <a:endParaRPr lang="en-US" dirty="0"/>
           </a:p>
         </p:txBody>
       </p:sp>
@@ -10413,10 +10440,9 @@
           <a:p>
             <a:pPr algn="ctr"/>
             <a:r>
-              <a:rPr lang="en-US" dirty="0" smtClean="0"/>
+              <a:rPr lang="en-US" dirty="0"/>
               <a:t>Function2</a:t>
             </a:r>
-            <a:endParaRPr lang="en-US" dirty="0"/>
           </a:p>
         </p:txBody>
       </p:sp>
@@ -10457,10 +10483,9 @@
           <a:p>
             <a:pPr algn="ctr"/>
             <a:r>
-              <a:rPr lang="en-US" dirty="0" smtClean="0"/>
+              <a:rPr lang="en-US" dirty="0"/>
               <a:t>Function3</a:t>
             </a:r>
-            <a:endParaRPr lang="en-US" dirty="0"/>
           </a:p>
         </p:txBody>
       </p:sp>
@@ -10611,13 +10636,6 @@
   <p:clrMapOvr>
     <a:masterClrMapping/>
   </p:clrMapOvr>
-  <p:timing>
-    <p:tnLst>
-      <p:par>
-        <p:cTn id="1" dur="indefinite" restart="never" nodeType="tmRoot"/>
-      </p:par>
-    </p:tnLst>
-  </p:timing>
 </p:sld>
 </file>
 
@@ -10654,10 +10672,9 @@
           <a:lstStyle/>
           <a:p>
             <a:r>
-              <a:rPr lang="en-US" dirty="0" smtClean="0"/>
+              <a:rPr lang="en-US" dirty="0"/>
               <a:t>F# Machine Learning</a:t>
             </a:r>
-            <a:endParaRPr lang="en-US" dirty="0"/>
           </a:p>
         </p:txBody>
       </p:sp>
@@ -10684,19 +10701,19 @@
           <a:lstStyle/>
           <a:p>
             <a:r>
-              <a:rPr lang="en-US" dirty="0" smtClean="0"/>
+              <a:rPr lang="en-US" dirty="0"/>
               <a:t>Most ML done in F# uses Accord.NET</a:t>
             </a:r>
           </a:p>
           <a:p>
             <a:r>
-              <a:rPr lang="en-US" dirty="0" smtClean="0"/>
+              <a:rPr lang="en-US" dirty="0"/>
               <a:t>Accord.NET is an open-source library started at Xerox</a:t>
             </a:r>
           </a:p>
           <a:p>
             <a:r>
-              <a:rPr lang="en-US" dirty="0" smtClean="0"/>
+              <a:rPr lang="en-US" dirty="0"/>
               <a:t>It has many of the basic ML models you would expect : regressions, classifications, neural networks, SVM, etc..</a:t>
             </a:r>
           </a:p>
@@ -10709,25 +10726,21 @@
             </a:pPr>
             <a:r>
               <a:rPr lang="en-US" i="1" dirty="0"/>
-              <a:t>http://accord-framework.net</a:t>
-            </a:r>
-            <a:r>
-              <a:rPr lang="en-US" i="1" dirty="0" smtClean="0"/>
-              <a:t>/</a:t>
+              <a:t>http://accord-framework.net/</a:t>
             </a:r>
             <a:endParaRPr lang="en-US" dirty="0"/>
           </a:p>
           <a:p>
-            <a:endParaRPr lang="en-US" dirty="0" smtClean="0"/>
+            <a:endParaRPr lang="en-US" dirty="0"/>
           </a:p>
           <a:p>
             <a:pPr marL="0" indent="0">
               <a:buNone/>
             </a:pPr>
-            <a:endParaRPr lang="en-US" dirty="0" smtClean="0"/>
-          </a:p>
-          <a:p>
-            <a:endParaRPr lang="en-US" dirty="0" smtClean="0"/>
+            <a:endParaRPr lang="en-US" dirty="0"/>
+          </a:p>
+          <a:p>
+            <a:endParaRPr lang="en-US" dirty="0"/>
           </a:p>
           <a:p>
             <a:endParaRPr lang="en-US" dirty="0"/>
@@ -10744,13 +10757,6 @@
   <p:clrMapOvr>
     <a:masterClrMapping/>
   </p:clrMapOvr>
-  <p:timing>
-    <p:tnLst>
-      <p:par>
-        <p:cTn id="1" dur="indefinite" restart="never" nodeType="tmRoot"/>
-      </p:par>
-    </p:tnLst>
-  </p:timing>
 </p:sld>
 </file>
 
@@ -10787,10 +10793,9 @@
           <a:lstStyle/>
           <a:p>
             <a:r>
-              <a:rPr lang="en-US" dirty="0" smtClean="0"/>
+              <a:rPr lang="en-US" dirty="0"/>
               <a:t>Agenda</a:t>
             </a:r>
-            <a:endParaRPr lang="en-US" dirty="0"/>
           </a:p>
         </p:txBody>
       </p:sp>
@@ -10812,50 +10817,46 @@
           <a:lstStyle/>
           <a:p>
             <a:r>
-              <a:rPr lang="en-US" dirty="0" smtClean="0"/>
+              <a:rPr lang="en-US" dirty="0"/>
               <a:t>Introductions</a:t>
             </a:r>
           </a:p>
           <a:p>
             <a:r>
-              <a:rPr lang="en-US" dirty="0" smtClean="0"/>
+              <a:rPr lang="en-US" dirty="0"/>
               <a:t>F# Overview</a:t>
             </a:r>
           </a:p>
           <a:p>
             <a:r>
-              <a:rPr lang="en-US" dirty="0" smtClean="0"/>
+              <a:rPr lang="en-US" dirty="0"/>
               <a:t>Type Providers</a:t>
             </a:r>
           </a:p>
           <a:p>
             <a:r>
-              <a:rPr lang="en-US" dirty="0" smtClean="0"/>
+              <a:rPr lang="en-US" dirty="0"/>
               <a:t>Data Manipulations</a:t>
             </a:r>
           </a:p>
           <a:p>
             <a:r>
-              <a:rPr lang="en-US" dirty="0" smtClean="0"/>
+              <a:rPr lang="en-US" dirty="0"/>
               <a:t>Choose Your Own Adventure</a:t>
             </a:r>
           </a:p>
           <a:p>
             <a:pPr lvl="1"/>
             <a:r>
-              <a:rPr lang="en-US" dirty="0" smtClean="0"/>
+              <a:rPr lang="en-US" dirty="0"/>
               <a:t>Data Validation</a:t>
             </a:r>
           </a:p>
           <a:p>
             <a:pPr lvl="1"/>
             <a:r>
-              <a:rPr lang="en-US" dirty="0" smtClean="0"/>
-              <a:t>Machine </a:t>
-            </a:r>
-            <a:r>
-              <a:rPr lang="en-US" dirty="0" smtClean="0"/>
-              <a:t>Learning</a:t>
+              <a:rPr lang="en-US" dirty="0"/>
+              <a:t>Machine Learning</a:t>
             </a:r>
           </a:p>
           <a:p>
@@ -10874,11 +10875,6 @@
               </a:rPr>
               <a:t>https://github.com/jamessdixon/PydataNYC</a:t>
             </a:r>
-            <a:endParaRPr lang="en-US" dirty="0">
-              <a:solidFill>
-                <a:srgbClr val="FF0000"/>
-              </a:solidFill>
-            </a:endParaRPr>
           </a:p>
         </p:txBody>
       </p:sp>
@@ -10892,13 +10888,6 @@
   <p:clrMapOvr>
     <a:masterClrMapping/>
   </p:clrMapOvr>
-  <p:timing>
-    <p:tnLst>
-      <p:par>
-        <p:cTn id="1" dur="indefinite" restart="never" nodeType="tmRoot"/>
-      </p:par>
-    </p:tnLst>
-  </p:timing>
 </p:sld>
 </file>
 
@@ -10935,10 +10924,9 @@
           <a:lstStyle/>
           <a:p>
             <a:r>
-              <a:rPr lang="en-US" dirty="0" smtClean="0"/>
+              <a:rPr lang="en-US" dirty="0"/>
               <a:t>Wrap Up</a:t>
             </a:r>
-            <a:endParaRPr lang="en-US" dirty="0"/>
           </a:p>
         </p:txBody>
       </p:sp>
@@ -10958,7 +10946,7 @@
           <a:lstStyle/>
           <a:p>
             <a:r>
-              <a:rPr lang="en-US" dirty="0" smtClean="0"/>
+              <a:rPr lang="en-US" dirty="0"/>
               <a:t>Questions?</a:t>
             </a:r>
           </a:p>
@@ -10967,32 +10955,32 @@
           </a:p>
           <a:p>
             <a:r>
-              <a:rPr lang="en-US" dirty="0" smtClean="0">
+              <a:rPr lang="en-US" dirty="0">
                 <a:hlinkClick r:id="rId2"/>
               </a:rPr>
               <a:t>jamessdixon@gmail.com</a:t>
             </a:r>
-            <a:endParaRPr lang="en-US" dirty="0" smtClean="0"/>
-          </a:p>
-          <a:p>
-            <a:r>
-              <a:rPr lang="en-US" dirty="0" smtClean="0"/>
+            <a:endParaRPr lang="en-US" dirty="0"/>
+          </a:p>
+          <a:p>
+            <a:r>
+              <a:rPr lang="en-US" dirty="0"/>
               <a:t>@</a:t>
             </a:r>
             <a:r>
-              <a:rPr lang="en-US" dirty="0" err="1" smtClean="0"/>
+              <a:rPr lang="en-US" dirty="0" err="1"/>
               <a:t>jamie_Dixon</a:t>
             </a:r>
-            <a:endParaRPr lang="en-US" dirty="0" smtClean="0"/>
-          </a:p>
-          <a:p>
-            <a:r>
-              <a:rPr lang="en-US" dirty="0" smtClean="0">
+            <a:endParaRPr lang="en-US" dirty="0"/>
+          </a:p>
+          <a:p>
+            <a:r>
+              <a:rPr lang="en-US" dirty="0">
                 <a:hlinkClick r:id="rId3"/>
               </a:rPr>
               <a:t>thomasmporterii@gmail.com</a:t>
             </a:r>
-            <a:endParaRPr lang="en-US" dirty="0" smtClean="0"/>
+            <a:endParaRPr lang="en-US" dirty="0"/>
           </a:p>
           <a:p>
             <a:r>
@@ -11017,13 +11005,6 @@
   <p:clrMapOvr>
     <a:masterClrMapping/>
   </p:clrMapOvr>
-  <p:timing>
-    <p:tnLst>
-      <p:par>
-        <p:cTn id="1" dur="indefinite" restart="never" nodeType="tmRoot"/>
-      </p:par>
-    </p:tnLst>
-  </p:timing>
 </p:sld>
 </file>
 
@@ -11060,10 +11041,9 @@
           <a:lstStyle/>
           <a:p>
             <a:r>
-              <a:rPr lang="en-US" dirty="0" smtClean="0"/>
+              <a:rPr lang="en-US" dirty="0"/>
               <a:t>Introductions</a:t>
             </a:r>
-            <a:endParaRPr lang="en-US" dirty="0"/>
           </a:p>
         </p:txBody>
       </p:sp>
@@ -11080,12 +11060,12 @@
         <p:spPr/>
         <p:txBody>
           <a:bodyPr>
-            <a:normAutofit lnSpcReduction="10000"/>
+            <a:normAutofit fontScale="92500" lnSpcReduction="20000"/>
           </a:bodyPr>
           <a:lstStyle/>
           <a:p>
             <a:r>
-              <a:rPr lang="en-US" dirty="0" smtClean="0"/>
+              <a:rPr lang="en-US" dirty="0"/>
               <a:t>Jamie</a:t>
             </a:r>
           </a:p>
@@ -11094,14 +11074,14 @@
               <a:buNone/>
             </a:pPr>
             <a:r>
-              <a:rPr lang="en-US" dirty="0" smtClean="0"/>
+              <a:rPr lang="en-US" dirty="0"/>
               <a:t>Software/Data Engineer.  Uses F# and Python.  (Occasional) Speaker.  Wrote Book on ML.  Lives in Cary NC</a:t>
             </a:r>
           </a:p>
           <a:p>
             <a:r>
-              <a:rPr lang="en-US" dirty="0" smtClean="0"/>
-              <a:t>Tom</a:t>
+              <a:rPr lang="en-US" dirty="0"/>
+              <a:t>Thomas</a:t>
             </a:r>
           </a:p>
           <a:p>
@@ -11109,13 +11089,13 @@
               <a:buNone/>
             </a:pPr>
             <a:r>
-              <a:rPr lang="en-US" dirty="0" smtClean="0"/>
-              <a:t>Awesome Dude</a:t>
-            </a:r>
-          </a:p>
-          <a:p>
-            <a:r>
-              <a:rPr lang="en-US" dirty="0" smtClean="0"/>
+              <a:rPr lang="en-US" dirty="0"/>
+              <a:t>Software/Data Engineer. Uses Python to gather SCM data and automate SCM tasks in GitHub and TFS. Uses F# for .NET tasks. Lives in Gilbert, AZ</a:t>
+            </a:r>
+          </a:p>
+          <a:p>
+            <a:r>
+              <a:rPr lang="en-US" dirty="0"/>
               <a:t>You</a:t>
             </a:r>
           </a:p>
@@ -11124,18 +11104,17 @@
               <a:buNone/>
             </a:pPr>
             <a:r>
-              <a:rPr lang="en-US" dirty="0" smtClean="0"/>
+              <a:rPr lang="en-US" dirty="0"/>
               <a:t>Python Level?  Java/C#/</a:t>
             </a:r>
             <a:r>
-              <a:rPr lang="en-US" dirty="0" err="1" smtClean="0"/>
+              <a:rPr lang="en-US" dirty="0" err="1"/>
               <a:t>Javascript</a:t>
             </a:r>
             <a:r>
-              <a:rPr lang="en-US" dirty="0" smtClean="0"/>
+              <a:rPr lang="en-US" dirty="0"/>
               <a:t> experience?  Functional Languages?  Developer/Data Scientist?</a:t>
             </a:r>
-            <a:endParaRPr lang="en-US" dirty="0"/>
           </a:p>
         </p:txBody>
       </p:sp>
@@ -11149,13 +11128,6 @@
   <p:clrMapOvr>
     <a:masterClrMapping/>
   </p:clrMapOvr>
-  <p:timing>
-    <p:tnLst>
-      <p:par>
-        <p:cTn id="1" dur="indefinite" restart="never" nodeType="tmRoot"/>
-      </p:par>
-    </p:tnLst>
-  </p:timing>
 </p:sld>
 </file>
 
@@ -11192,10 +11164,9 @@
           <a:lstStyle/>
           <a:p>
             <a:r>
-              <a:rPr lang="en-US" dirty="0" smtClean="0"/>
+              <a:rPr lang="en-US" dirty="0"/>
               <a:t>F# Overview</a:t>
             </a:r>
-            <a:endParaRPr lang="en-US" dirty="0"/>
           </a:p>
         </p:txBody>
       </p:sp>
@@ -11215,46 +11186,45 @@
           <a:lstStyle/>
           <a:p>
             <a:r>
-              <a:rPr lang="en-US" dirty="0" smtClean="0"/>
+              <a:rPr lang="en-US" dirty="0"/>
               <a:t>Strongly Typed</a:t>
             </a:r>
           </a:p>
           <a:p>
             <a:r>
-              <a:rPr lang="en-US" dirty="0" smtClean="0"/>
+              <a:rPr lang="en-US" dirty="0"/>
               <a:t>Functional-First.  Can Support OO and Imperative</a:t>
             </a:r>
           </a:p>
           <a:p>
             <a:r>
-              <a:rPr lang="en-US" dirty="0" err="1" smtClean="0"/>
+              <a:rPr lang="en-US" dirty="0" err="1"/>
               <a:t>.Net</a:t>
             </a:r>
             <a:r>
-              <a:rPr lang="en-US" dirty="0" smtClean="0"/>
+              <a:rPr lang="en-US" dirty="0"/>
               <a:t> language – interop with C# and VB.NET</a:t>
             </a:r>
           </a:p>
           <a:p>
             <a:r>
-              <a:rPr lang="en-US" dirty="0" smtClean="0"/>
+              <a:rPr lang="en-US" dirty="0"/>
               <a:t>General Purpose, Open Sourced, and X-Plat  </a:t>
             </a:r>
           </a:p>
           <a:p>
             <a:r>
-              <a:rPr lang="en-US" dirty="0" smtClean="0"/>
+              <a:rPr lang="en-US" dirty="0"/>
               <a:t>Created by MSFT Research in 2005 based on </a:t>
             </a:r>
             <a:r>
-              <a:rPr lang="en-US" dirty="0" err="1" smtClean="0"/>
+              <a:rPr lang="en-US" dirty="0" err="1"/>
               <a:t>OCaml</a:t>
             </a:r>
             <a:r>
-              <a:rPr lang="en-US" dirty="0" smtClean="0"/>
+              <a:rPr lang="en-US" dirty="0"/>
               <a:t>.  Now version 4.x </a:t>
             </a:r>
-            <a:endParaRPr lang="en-US" dirty="0"/>
           </a:p>
         </p:txBody>
       </p:sp>
@@ -11268,13 +11238,6 @@
   <p:clrMapOvr>
     <a:masterClrMapping/>
   </p:clrMapOvr>
-  <p:timing>
-    <p:tnLst>
-      <p:par>
-        <p:cTn id="1" dur="indefinite" restart="never" nodeType="tmRoot"/>
-      </p:par>
-    </p:tnLst>
-  </p:timing>
 </p:sld>
 </file>
 
@@ -11311,10 +11274,9 @@
           <a:lstStyle/>
           <a:p>
             <a:r>
-              <a:rPr lang="en-US" dirty="0" smtClean="0"/>
+              <a:rPr lang="en-US" dirty="0"/>
               <a:t>F# Overview: Inferred Typing</a:t>
             </a:r>
-            <a:endParaRPr lang="en-US" dirty="0"/>
           </a:p>
         </p:txBody>
       </p:sp>
@@ -11336,13 +11298,13 @@
           <a:lstStyle/>
           <a:p>
             <a:r>
-              <a:rPr lang="en-US" dirty="0" smtClean="0"/>
+              <a:rPr lang="en-US" dirty="0"/>
               <a:t>Type system ensures correctness and prevents bug</a:t>
             </a:r>
           </a:p>
           <a:p>
             <a:r>
-              <a:rPr lang="en-US" dirty="0" smtClean="0"/>
+              <a:rPr lang="en-US" dirty="0"/>
               <a:t>Inferred means compiler figures it out for you</a:t>
             </a:r>
           </a:p>
@@ -11351,15 +11313,15 @@
               <a:buNone/>
             </a:pPr>
             <a:r>
-              <a:rPr lang="en-US" dirty="0" smtClean="0"/>
+              <a:rPr lang="en-US" dirty="0"/>
               <a:t>Person p = new Person(“Jamie”, 42, </a:t>
             </a:r>
             <a:r>
-              <a:rPr lang="en-US" dirty="0" err="1" smtClean="0"/>
+              <a:rPr lang="en-US" dirty="0" err="1"/>
               <a:t>Gender.Male</a:t>
             </a:r>
             <a:r>
-              <a:rPr lang="en-US" dirty="0" smtClean="0"/>
+              <a:rPr lang="en-US" dirty="0"/>
               <a:t>);</a:t>
             </a:r>
           </a:p>
@@ -11368,7 +11330,7 @@
               <a:buNone/>
             </a:pPr>
             <a:r>
-              <a:rPr lang="en-US" dirty="0" smtClean="0"/>
+              <a:rPr lang="en-US" dirty="0"/>
               <a:t>p = Person(“Jamie”,42,Gender.MALE)</a:t>
             </a:r>
           </a:p>
@@ -11377,39 +11339,16 @@
               <a:buNone/>
             </a:pPr>
             <a:r>
-              <a:rPr lang="en-US" dirty="0" smtClean="0"/>
+              <a:rPr lang="en-US" dirty="0"/>
               <a:t>let p = new Person(“Jamie”, 42, </a:t>
             </a:r>
             <a:r>
-              <a:rPr lang="en-US" dirty="0" err="1" smtClean="0"/>
+              <a:rPr lang="en-US" dirty="0" err="1"/>
               <a:t>Gender.Male</a:t>
             </a:r>
             <a:r>
-              <a:rPr lang="en-US" dirty="0" smtClean="0"/>
+              <a:rPr lang="en-US" dirty="0"/>
               <a:t>)</a:t>
-            </a:r>
-          </a:p>
-          <a:p>
-            <a:pPr marL="0" indent="0">
-              <a:buNone/>
-            </a:pPr>
-            <a:endParaRPr lang="en-US" dirty="0" smtClean="0"/>
-          </a:p>
-          <a:p>
-            <a:pPr marL="0" indent="0">
-              <a:buNone/>
-            </a:pPr>
-            <a:r>
-              <a:rPr lang="en-US" dirty="0" smtClean="0"/>
-              <a:t>Not just for data structures, everything is inferred and typed: arguments*, return values, functions</a:t>
-            </a:r>
-            <a:r>
-              <a:rPr lang="en-US" dirty="0"/>
-              <a:t> </a:t>
-            </a:r>
-            <a:r>
-              <a:rPr lang="en-US" dirty="0" smtClean="0"/>
-              <a:t>them selves, etc.. </a:t>
             </a:r>
           </a:p>
           <a:p>
@@ -11423,27 +11362,41 @@
               <a:buNone/>
             </a:pPr>
             <a:r>
-              <a:rPr lang="en-US" dirty="0" smtClean="0"/>
-              <a:t>*Sometimes the compiler can’t figure out what you are doing, so you need to give it a hint (</a:t>
-            </a:r>
-            <a:r>
-              <a:rPr lang="en-US" dirty="0" err="1" smtClean="0"/>
-              <a:t>myString:string</a:t>
-            </a:r>
-            <a:r>
-              <a:rPr lang="en-US" dirty="0" smtClean="0"/>
-              <a:t>)</a:t>
+              <a:rPr lang="en-US" dirty="0"/>
+              <a:t>Not just for data structures, everything is inferred and typed: arguments*, return values, functions them selves, etc.. </a:t>
             </a:r>
           </a:p>
           <a:p>
             <a:pPr marL="0" indent="0">
               <a:buNone/>
             </a:pPr>
-            <a:r>
-              <a:rPr lang="en-US" dirty="0" smtClean="0"/>
+            <a:endParaRPr lang="en-US" dirty="0"/>
+          </a:p>
+          <a:p>
+            <a:pPr marL="0" indent="0">
+              <a:buNone/>
+            </a:pPr>
+            <a:r>
+              <a:rPr lang="en-US" dirty="0"/>
+              <a:t>*Sometimes the compiler can’t figure out what you are doing, so you need to give it a hint (</a:t>
+            </a:r>
+            <a:r>
+              <a:rPr lang="en-US" dirty="0" err="1"/>
+              <a:t>myString:string</a:t>
+            </a:r>
+            <a:r>
+              <a:rPr lang="en-US" dirty="0"/>
+              <a:t>)</a:t>
+            </a:r>
+          </a:p>
+          <a:p>
+            <a:pPr marL="0" indent="0">
+              <a:buNone/>
+            </a:pPr>
+            <a:r>
+              <a:rPr lang="en-US" dirty="0"/>
               <a:t>	</a:t>
             </a:r>
-            <a:endParaRPr lang="en-US" dirty="0"/>
           </a:p>
         </p:txBody>
       </p:sp>
@@ -11457,13 +11410,6 @@
   <p:clrMapOvr>
     <a:masterClrMapping/>
   </p:clrMapOvr>
-  <p:timing>
-    <p:tnLst>
-      <p:par>
-        <p:cTn id="1" dur="indefinite" restart="never" nodeType="tmRoot"/>
-      </p:par>
-    </p:tnLst>
-  </p:timing>
 </p:sld>
 </file>
 
@@ -11500,10 +11446,9 @@
           <a:lstStyle/>
           <a:p>
             <a:r>
-              <a:rPr lang="en-US" dirty="0" smtClean="0"/>
+              <a:rPr lang="en-US" dirty="0"/>
               <a:t>F# Overview: Immutable</a:t>
             </a:r>
-            <a:endParaRPr lang="en-US" dirty="0"/>
           </a:p>
         </p:txBody>
       </p:sp>
@@ -11525,61 +11470,61 @@
           <a:lstStyle/>
           <a:p>
             <a:r>
-              <a:rPr lang="en-US" dirty="0" smtClean="0"/>
+              <a:rPr lang="en-US" dirty="0"/>
               <a:t>let x = 3 + 4 binds the value 7 to x</a:t>
             </a:r>
           </a:p>
           <a:p>
             <a:r>
-              <a:rPr lang="en-US" dirty="0" smtClean="0"/>
+              <a:rPr lang="en-US" dirty="0"/>
               <a:t>let x = 7 + 6 throws a compiler error</a:t>
             </a:r>
           </a:p>
           <a:p>
             <a:r>
-              <a:rPr lang="en-US" dirty="0" smtClean="0"/>
+              <a:rPr lang="en-US" dirty="0"/>
               <a:t>x = 7 + 6 resolves to “false”</a:t>
             </a:r>
           </a:p>
           <a:p>
-            <a:endParaRPr lang="en-US" dirty="0" smtClean="0"/>
-          </a:p>
-          <a:p>
-            <a:r>
-              <a:rPr lang="en-US" dirty="0" smtClean="0"/>
+            <a:endParaRPr lang="en-US" dirty="0"/>
+          </a:p>
+          <a:p>
+            <a:r>
+              <a:rPr lang="en-US" dirty="0"/>
               <a:t>let </a:t>
             </a:r>
             <a:r>
-              <a:rPr lang="en-US" dirty="0" err="1" smtClean="0"/>
+              <a:rPr lang="en-US" dirty="0" err="1"/>
               <a:t>dogNames</a:t>
             </a:r>
             <a:r>
-              <a:rPr lang="en-US" dirty="0" smtClean="0"/>
+              <a:rPr lang="en-US" dirty="0"/>
               <a:t> = [“</a:t>
             </a:r>
             <a:r>
-              <a:rPr lang="en-US" dirty="0" err="1" smtClean="0"/>
+              <a:rPr lang="en-US" dirty="0" err="1"/>
               <a:t>Max”;”Charlie”;”Buddy</a:t>
             </a:r>
             <a:r>
-              <a:rPr lang="en-US" dirty="0" smtClean="0"/>
+              <a:rPr lang="en-US" dirty="0"/>
               <a:t>”]</a:t>
             </a:r>
           </a:p>
           <a:p>
-            <a:endParaRPr lang="en-US" dirty="0" smtClean="0"/>
-          </a:p>
-          <a:p>
-            <a:r>
-              <a:rPr lang="en-US" dirty="0" smtClean="0"/>
+            <a:endParaRPr lang="en-US" dirty="0"/>
+          </a:p>
+          <a:p>
+            <a:r>
+              <a:rPr lang="en-US" dirty="0"/>
               <a:t>let </a:t>
             </a:r>
             <a:r>
-              <a:rPr lang="en-US" dirty="0" err="1" smtClean="0"/>
+              <a:rPr lang="en-US" dirty="0" err="1"/>
               <a:t>newDogNames</a:t>
             </a:r>
             <a:r>
-              <a:rPr lang="en-US" dirty="0" smtClean="0"/>
+              <a:rPr lang="en-US" dirty="0"/>
               <a:t> = </a:t>
             </a:r>
           </a:p>
@@ -11592,19 +11537,19 @@
               <a:t>	</a:t>
             </a:r>
             <a:r>
-              <a:rPr lang="en-US" dirty="0" err="1" smtClean="0"/>
+              <a:rPr lang="en-US" dirty="0" err="1"/>
               <a:t>dogNames</a:t>
             </a:r>
             <a:r>
-              <a:rPr lang="en-US" dirty="0" smtClean="0"/>
+              <a:rPr lang="en-US" dirty="0"/>
               <a:t> |&gt; </a:t>
             </a:r>
             <a:r>
-              <a:rPr lang="en-US" dirty="0" err="1" smtClean="0"/>
+              <a:rPr lang="en-US" dirty="0" err="1"/>
               <a:t>seq.map</a:t>
             </a:r>
             <a:r>
-              <a:rPr lang="en-US" dirty="0" smtClean="0"/>
+              <a:rPr lang="en-US" dirty="0"/>
               <a:t>(fun d -&gt; d + “ the dog”)</a:t>
             </a:r>
           </a:p>
@@ -11612,31 +11557,31 @@
             <a:pPr marL="0" indent="0">
               <a:buNone/>
             </a:pPr>
-            <a:endParaRPr lang="en-US" dirty="0" smtClean="0"/>
-          </a:p>
-          <a:p>
-            <a:r>
-              <a:rPr lang="en-US" dirty="0" err="1" smtClean="0"/>
+            <a:endParaRPr lang="en-US" dirty="0"/>
+          </a:p>
+          <a:p>
+            <a:r>
+              <a:rPr lang="en-US" dirty="0" err="1"/>
               <a:t>dogNames</a:t>
             </a:r>
             <a:r>
-              <a:rPr lang="en-US" dirty="0" smtClean="0"/>
+              <a:rPr lang="en-US" dirty="0"/>
               <a:t> = </a:t>
             </a:r>
             <a:r>
-              <a:rPr lang="en-US" dirty="0" err="1" smtClean="0"/>
+              <a:rPr lang="en-US" dirty="0" err="1"/>
               <a:t>dogNames</a:t>
             </a:r>
             <a:r>
-              <a:rPr lang="en-US" dirty="0" smtClean="0"/>
+              <a:rPr lang="en-US" dirty="0"/>
               <a:t> |&gt; </a:t>
             </a:r>
             <a:r>
-              <a:rPr lang="en-US" dirty="0" err="1" smtClean="0"/>
+              <a:rPr lang="en-US" dirty="0" err="1"/>
               <a:t>seq.map</a:t>
             </a:r>
             <a:r>
-              <a:rPr lang="en-US" dirty="0" smtClean="0"/>
+              <a:rPr lang="en-US" dirty="0"/>
               <a:t>(fun p -&gt; p + “ the dog”) throws a compiler error</a:t>
             </a:r>
           </a:p>
@@ -11644,17 +11589,16 @@
             <a:pPr marL="0" indent="0">
               <a:buNone/>
             </a:pPr>
-            <a:endParaRPr lang="en-US" dirty="0" smtClean="0"/>
+            <a:endParaRPr lang="en-US" dirty="0"/>
           </a:p>
           <a:p>
             <a:pPr marL="0" indent="0">
               <a:buNone/>
             </a:pPr>
             <a:r>
-              <a:rPr lang="en-US" sz="1300" dirty="0" smtClean="0"/>
+              <a:rPr lang="en-US" sz="1300" dirty="0"/>
               <a:t>https://www.rover.com/blog/100-most-popular-male-female-dog-names-2016/</a:t>
             </a:r>
-            <a:endParaRPr lang="en-US" sz="1300" dirty="0"/>
           </a:p>
         </p:txBody>
       </p:sp>
@@ -11668,13 +11612,6 @@
   <p:clrMapOvr>
     <a:masterClrMapping/>
   </p:clrMapOvr>
-  <p:timing>
-    <p:tnLst>
-      <p:par>
-        <p:cTn id="1" dur="indefinite" restart="never" nodeType="tmRoot"/>
-      </p:par>
-    </p:tnLst>
-  </p:timing>
 </p:sld>
 </file>
 
@@ -11711,10 +11648,9 @@
           <a:lstStyle/>
           <a:p>
             <a:r>
-              <a:rPr lang="en-US" dirty="0" smtClean="0"/>
+              <a:rPr lang="en-US" dirty="0"/>
               <a:t>F# Overview: Minimalistic</a:t>
             </a:r>
-            <a:endParaRPr lang="en-US" dirty="0"/>
           </a:p>
         </p:txBody>
       </p:sp>
@@ -11734,30 +11670,30 @@
           <a:lstStyle/>
           <a:p>
             <a:r>
-              <a:rPr lang="en-US" dirty="0" smtClean="0"/>
+              <a:rPr lang="en-US" dirty="0"/>
               <a:t>No semi-colons</a:t>
             </a:r>
           </a:p>
           <a:p>
             <a:r>
-              <a:rPr lang="en-US" dirty="0" smtClean="0"/>
+              <a:rPr lang="en-US" dirty="0"/>
               <a:t>No curly braces</a:t>
             </a:r>
           </a:p>
           <a:p>
             <a:r>
-              <a:rPr lang="en-US" dirty="0" smtClean="0"/>
+              <a:rPr lang="en-US" dirty="0"/>
               <a:t>White space has meaning</a:t>
             </a:r>
           </a:p>
           <a:p>
             <a:r>
-              <a:rPr lang="en-US" dirty="0" smtClean="0"/>
+              <a:rPr lang="en-US" dirty="0"/>
               <a:t>Use the REPL, not test apps or unit tests</a:t>
             </a:r>
           </a:p>
           <a:p>
-            <a:endParaRPr lang="en-US" dirty="0" smtClean="0"/>
+            <a:endParaRPr lang="en-US" dirty="0"/>
           </a:p>
           <a:p>
             <a:endParaRPr lang="en-US" dirty="0"/>
@@ -11885,13 +11821,6 @@
   <p:clrMapOvr>
     <a:masterClrMapping/>
   </p:clrMapOvr>
-  <p:timing>
-    <p:tnLst>
-      <p:par>
-        <p:cTn id="1" dur="indefinite" restart="never" nodeType="tmRoot"/>
-      </p:par>
-    </p:tnLst>
-  </p:timing>
 </p:sld>
 </file>
 
@@ -11928,10 +11857,9 @@
           <a:lstStyle/>
           <a:p>
             <a:r>
-              <a:rPr lang="en-US" dirty="0" smtClean="0"/>
+              <a:rPr lang="en-US" dirty="0"/>
               <a:t>F# Overview</a:t>
             </a:r>
-            <a:endParaRPr lang="en-US" dirty="0"/>
           </a:p>
         </p:txBody>
       </p:sp>
@@ -11951,10 +11879,9 @@
           <a:lstStyle/>
           <a:p>
             <a:r>
-              <a:rPr lang="en-US" dirty="0" smtClean="0"/>
+              <a:rPr lang="en-US" dirty="0"/>
               <a:t>&lt;demo /&gt;</a:t>
             </a:r>
-            <a:endParaRPr lang="en-US" dirty="0"/>
           </a:p>
         </p:txBody>
       </p:sp>
@@ -11968,13 +11895,6 @@
   <p:clrMapOvr>
     <a:masterClrMapping/>
   </p:clrMapOvr>
-  <p:timing>
-    <p:tnLst>
-      <p:par>
-        <p:cTn id="1" dur="indefinite" restart="never" nodeType="tmRoot"/>
-      </p:par>
-    </p:tnLst>
-  </p:timing>
 </p:sld>
 </file>
 
@@ -12011,10 +11931,9 @@
           <a:lstStyle/>
           <a:p>
             <a:r>
-              <a:rPr lang="en-US" dirty="0" smtClean="0"/>
+              <a:rPr lang="en-US" dirty="0"/>
               <a:t>F# Type Providers</a:t>
             </a:r>
-            <a:endParaRPr lang="en-US" dirty="0"/>
           </a:p>
         </p:txBody>
       </p:sp>
@@ -12034,27 +11953,27 @@
           <a:lstStyle/>
           <a:p>
             <a:r>
-              <a:rPr lang="en-US" dirty="0" smtClean="0"/>
+              <a:rPr lang="en-US" dirty="0"/>
               <a:t>Like Python csv, json, </a:t>
             </a:r>
             <a:r>
-              <a:rPr lang="en-US" dirty="0" err="1" smtClean="0"/>
+              <a:rPr lang="en-US" dirty="0" err="1"/>
               <a:t>sql</a:t>
             </a:r>
             <a:r>
-              <a:rPr lang="en-US" dirty="0" smtClean="0"/>
+              <a:rPr lang="en-US" dirty="0"/>
               <a:t> modules, can import data from a variety of sources</a:t>
             </a:r>
           </a:p>
           <a:p>
             <a:r>
-              <a:rPr lang="en-US" dirty="0" smtClean="0"/>
+              <a:rPr lang="en-US" dirty="0"/>
               <a:t>Unlike Python, it is unified and standardized</a:t>
             </a:r>
           </a:p>
           <a:p>
             <a:r>
-              <a:rPr lang="en-US" dirty="0" smtClean="0"/>
+              <a:rPr lang="en-US" dirty="0"/>
               <a:t>Data is typed on read </a:t>
             </a:r>
           </a:p>
@@ -12063,33 +11982,33 @@
               <a:buNone/>
             </a:pPr>
             <a:r>
-              <a:rPr lang="en-US" dirty="0" smtClean="0"/>
+              <a:rPr lang="en-US" dirty="0"/>
               <a:t>– no casting needed</a:t>
             </a:r>
           </a:p>
           <a:p>
             <a:pPr lvl="1"/>
             <a:r>
-              <a:rPr lang="en-US" dirty="0" smtClean="0"/>
+              <a:rPr lang="en-US" dirty="0"/>
               <a:t>Can walk the object graph</a:t>
             </a:r>
           </a:p>
           <a:p>
             <a:r>
-              <a:rPr lang="en-US" dirty="0" smtClean="0"/>
+              <a:rPr lang="en-US" dirty="0"/>
               <a:t>Data is validated on read (or not)</a:t>
             </a:r>
           </a:p>
           <a:p>
             <a:r>
-              <a:rPr lang="en-US" dirty="0" smtClean="0"/>
+              <a:rPr lang="en-US" dirty="0"/>
               <a:t>Most are in </a:t>
             </a:r>
             <a:r>
-              <a:rPr lang="en-US" dirty="0" err="1" smtClean="0"/>
+              <a:rPr lang="en-US" dirty="0" err="1"/>
               <a:t>FSharp.Data</a:t>
             </a:r>
-            <a:endParaRPr lang="en-US" dirty="0" smtClean="0"/>
+            <a:endParaRPr lang="en-US" dirty="0"/>
           </a:p>
           <a:p>
             <a:endParaRPr lang="en-US" dirty="0"/>
@@ -12106,13 +12025,6 @@
   <p:clrMapOvr>
     <a:masterClrMapping/>
   </p:clrMapOvr>
-  <p:timing>
-    <p:tnLst>
-      <p:par>
-        <p:cTn id="1" dur="indefinite" restart="never" nodeType="tmRoot"/>
-      </p:par>
-    </p:tnLst>
-  </p:timing>
 </p:sld>
 </file>
 

</xml_diff>